<commit_message>
modify bib and simplify content
</commit_message>
<xml_diff>
--- a/paper/figures/framework2.pptx
+++ b/paper/figures/framework2.pptx
@@ -2,7 +2,7 @@
 <file path=ppt/presentation.xml><?xml version="1.0" encoding="utf-8"?>
 <p:presentation xmlns:a="http://schemas.openxmlformats.org/drawingml/2006/main" xmlns:r="http://schemas.openxmlformats.org/officeDocument/2006/relationships" xmlns:p="http://schemas.openxmlformats.org/presentationml/2006/main" saveSubsetFonts="1">
   <p:sldMasterIdLst>
-    <p:sldMasterId id="2147483684" r:id="rId1"/>
+    <p:sldMasterId id="2147483696" r:id="rId1"/>
   </p:sldMasterIdLst>
   <p:notesMasterIdLst>
     <p:notesMasterId r:id="rId3"/>
@@ -10,7 +10,7 @@
   <p:sldIdLst>
     <p:sldId id="256" r:id="rId2"/>
   </p:sldIdLst>
-  <p:sldSz cx="11831638" cy="4337050"/>
+  <p:sldSz cx="11831638" cy="3976688"/>
   <p:notesSz cx="6858000" cy="9144000"/>
   <p:defaultTextStyle>
     <a:defPPr>
@@ -197,7 +197,7 @@
           <a:p>
             <a:fld id="{565B4B56-32A4-4E7E-B32C-594EE8F61FCB}" type="datetimeFigureOut">
               <a:rPr lang="zh-CN" altLang="en-US" smtClean="0"/>
-              <a:t>2020/12/10</a:t>
+              <a:t>2020/12/13</a:t>
             </a:fld>
             <a:endParaRPr lang="zh-CN" altLang="en-US"/>
           </a:p>
@@ -215,8 +215,8 @@
         </p:nvSpPr>
         <p:spPr>
           <a:xfrm>
-            <a:off x="-779463" y="1143000"/>
-            <a:ext cx="8416926" cy="3086100"/>
+            <a:off x="-1160463" y="1143000"/>
+            <a:ext cx="9178926" cy="3086100"/>
           </a:xfrm>
           <a:prstGeom prst="rect">
             <a:avLst/>
@@ -493,8 +493,8 @@
         </p:nvSpPr>
         <p:spPr>
           <a:xfrm>
-            <a:off x="-779463" y="1143000"/>
-            <a:ext cx="8416926" cy="3086100"/>
+            <a:off x="-1160463" y="1143000"/>
+            <a:ext cx="9178926" cy="3086100"/>
           </a:xfrm>
         </p:spPr>
       </p:sp>
@@ -582,15 +582,15 @@
         </p:nvSpPr>
         <p:spPr>
           <a:xfrm>
-            <a:off x="1478955" y="709791"/>
-            <a:ext cx="8873729" cy="1509936"/>
+            <a:off x="1478955" y="650815"/>
+            <a:ext cx="8873729" cy="1384477"/>
           </a:xfrm>
         </p:spPr>
         <p:txBody>
           <a:bodyPr anchor="b"/>
           <a:lstStyle>
             <a:lvl1pPr algn="ctr">
-              <a:defRPr sz="3794"/>
+              <a:defRPr sz="3479"/>
             </a:lvl1pPr>
           </a:lstStyle>
           <a:p>
@@ -614,8 +614,8 @@
         </p:nvSpPr>
         <p:spPr>
           <a:xfrm>
-            <a:off x="1478955" y="2277956"/>
-            <a:ext cx="8873729" cy="1047116"/>
+            <a:off x="1478955" y="2088682"/>
+            <a:ext cx="8873729" cy="960112"/>
           </a:xfrm>
         </p:spPr>
         <p:txBody>
@@ -623,39 +623,39 @@
           <a:lstStyle>
             <a:lvl1pPr marL="0" indent="0" algn="ctr">
               <a:buNone/>
-              <a:defRPr sz="1518"/>
+              <a:defRPr sz="1392"/>
             </a:lvl1pPr>
-            <a:lvl2pPr marL="289133" indent="0" algn="ctr">
+            <a:lvl2pPr marL="265130" indent="0" algn="ctr">
               <a:buNone/>
-              <a:defRPr sz="1265"/>
+              <a:defRPr sz="1160"/>
             </a:lvl2pPr>
-            <a:lvl3pPr marL="578267" indent="0" algn="ctr">
+            <a:lvl3pPr marL="530261" indent="0" algn="ctr">
               <a:buNone/>
-              <a:defRPr sz="1138"/>
+              <a:defRPr sz="1044"/>
             </a:lvl3pPr>
-            <a:lvl4pPr marL="867400" indent="0" algn="ctr">
+            <a:lvl4pPr marL="795391" indent="0" algn="ctr">
               <a:buNone/>
-              <a:defRPr sz="1012"/>
+              <a:defRPr sz="928"/>
             </a:lvl4pPr>
-            <a:lvl5pPr marL="1156533" indent="0" algn="ctr">
+            <a:lvl5pPr marL="1060521" indent="0" algn="ctr">
               <a:buNone/>
-              <a:defRPr sz="1012"/>
+              <a:defRPr sz="928"/>
             </a:lvl5pPr>
-            <a:lvl6pPr marL="1445666" indent="0" algn="ctr">
+            <a:lvl6pPr marL="1325651" indent="0" algn="ctr">
               <a:buNone/>
-              <a:defRPr sz="1012"/>
+              <a:defRPr sz="928"/>
             </a:lvl6pPr>
-            <a:lvl7pPr marL="1734800" indent="0" algn="ctr">
+            <a:lvl7pPr marL="1590782" indent="0" algn="ctr">
               <a:buNone/>
-              <a:defRPr sz="1012"/>
+              <a:defRPr sz="928"/>
             </a:lvl7pPr>
-            <a:lvl8pPr marL="2023933" indent="0" algn="ctr">
+            <a:lvl8pPr marL="1855912" indent="0" algn="ctr">
               <a:buNone/>
-              <a:defRPr sz="1012"/>
+              <a:defRPr sz="928"/>
             </a:lvl8pPr>
-            <a:lvl9pPr marL="2313066" indent="0" algn="ctr">
+            <a:lvl9pPr marL="2121042" indent="0" algn="ctr">
               <a:buNone/>
-              <a:defRPr sz="1012"/>
+              <a:defRPr sz="928"/>
             </a:lvl9pPr>
           </a:lstStyle>
           <a:p>
@@ -684,7 +684,7 @@
           <a:p>
             <a:fld id="{A627DF43-A246-43EE-926C-71914852C54A}" type="datetimeFigureOut">
               <a:rPr lang="zh-CN" altLang="en-US" smtClean="0"/>
-              <a:t>2020/12/10</a:t>
+              <a:t>2020/12/13</a:t>
             </a:fld>
             <a:endParaRPr lang="zh-CN" altLang="en-US"/>
           </a:p>
@@ -735,7 +735,7 @@
     </p:spTree>
     <p:extLst>
       <p:ext uri="{BB962C8B-B14F-4D97-AF65-F5344CB8AC3E}">
-        <p14:creationId xmlns:p14="http://schemas.microsoft.com/office/powerpoint/2010/main" val="3655498764"/>
+        <p14:creationId xmlns:p14="http://schemas.microsoft.com/office/powerpoint/2010/main" val="567643345"/>
       </p:ext>
     </p:extLst>
   </p:cSld>
@@ -854,7 +854,7 @@
           <a:p>
             <a:fld id="{A627DF43-A246-43EE-926C-71914852C54A}" type="datetimeFigureOut">
               <a:rPr lang="zh-CN" altLang="en-US" smtClean="0"/>
-              <a:t>2020/12/10</a:t>
+              <a:t>2020/12/13</a:t>
             </a:fld>
             <a:endParaRPr lang="zh-CN" altLang="en-US"/>
           </a:p>
@@ -905,7 +905,7 @@
     </p:spTree>
     <p:extLst>
       <p:ext uri="{BB962C8B-B14F-4D97-AF65-F5344CB8AC3E}">
-        <p14:creationId xmlns:p14="http://schemas.microsoft.com/office/powerpoint/2010/main" val="1727293924"/>
+        <p14:creationId xmlns:p14="http://schemas.microsoft.com/office/powerpoint/2010/main" val="3581820794"/>
       </p:ext>
     </p:extLst>
   </p:cSld>
@@ -944,8 +944,8 @@
         </p:nvSpPr>
         <p:spPr>
           <a:xfrm>
-            <a:off x="8467016" y="230908"/>
-            <a:ext cx="2551197" cy="3675449"/>
+            <a:off x="8467016" y="211722"/>
+            <a:ext cx="2551197" cy="3370059"/>
           </a:xfrm>
         </p:spPr>
         <p:txBody>
@@ -972,8 +972,8 @@
         </p:nvSpPr>
         <p:spPr>
           <a:xfrm>
-            <a:off x="813425" y="230908"/>
-            <a:ext cx="7505695" cy="3675449"/>
+            <a:off x="813425" y="211722"/>
+            <a:ext cx="7505695" cy="3370059"/>
           </a:xfrm>
         </p:spPr>
         <p:txBody>
@@ -1034,7 +1034,7 @@
           <a:p>
             <a:fld id="{A627DF43-A246-43EE-926C-71914852C54A}" type="datetimeFigureOut">
               <a:rPr lang="zh-CN" altLang="en-US" smtClean="0"/>
-              <a:t>2020/12/10</a:t>
+              <a:t>2020/12/13</a:t>
             </a:fld>
             <a:endParaRPr lang="zh-CN" altLang="en-US"/>
           </a:p>
@@ -1085,7 +1085,7 @@
     </p:spTree>
     <p:extLst>
       <p:ext uri="{BB962C8B-B14F-4D97-AF65-F5344CB8AC3E}">
-        <p14:creationId xmlns:p14="http://schemas.microsoft.com/office/powerpoint/2010/main" val="421006474"/>
+        <p14:creationId xmlns:p14="http://schemas.microsoft.com/office/powerpoint/2010/main" val="3475871447"/>
       </p:ext>
     </p:extLst>
   </p:cSld>
@@ -1204,7 +1204,7 @@
           <a:p>
             <a:fld id="{A627DF43-A246-43EE-926C-71914852C54A}" type="datetimeFigureOut">
               <a:rPr lang="zh-CN" altLang="en-US" smtClean="0"/>
-              <a:t>2020/12/10</a:t>
+              <a:t>2020/12/13</a:t>
             </a:fld>
             <a:endParaRPr lang="zh-CN" altLang="en-US"/>
           </a:p>
@@ -1255,7 +1255,7 @@
     </p:spTree>
     <p:extLst>
       <p:ext uri="{BB962C8B-B14F-4D97-AF65-F5344CB8AC3E}">
-        <p14:creationId xmlns:p14="http://schemas.microsoft.com/office/powerpoint/2010/main" val="1149523721"/>
+        <p14:creationId xmlns:p14="http://schemas.microsoft.com/office/powerpoint/2010/main" val="3399689933"/>
       </p:ext>
     </p:extLst>
   </p:cSld>
@@ -1294,15 +1294,15 @@
         </p:nvSpPr>
         <p:spPr>
           <a:xfrm>
-            <a:off x="807263" y="1081251"/>
-            <a:ext cx="10204788" cy="1804092"/>
+            <a:off x="807263" y="991411"/>
+            <a:ext cx="10204788" cy="1654191"/>
           </a:xfrm>
         </p:spPr>
         <p:txBody>
           <a:bodyPr anchor="b"/>
           <a:lstStyle>
             <a:lvl1pPr>
-              <a:defRPr sz="3794"/>
+              <a:defRPr sz="3479"/>
             </a:lvl1pPr>
           </a:lstStyle>
           <a:p>
@@ -1326,8 +1326,8 @@
         </p:nvSpPr>
         <p:spPr>
           <a:xfrm>
-            <a:off x="807263" y="2902411"/>
-            <a:ext cx="10204788" cy="948729"/>
+            <a:off x="807263" y="2661252"/>
+            <a:ext cx="10204788" cy="869900"/>
           </a:xfrm>
         </p:spPr>
         <p:txBody>
@@ -1335,7 +1335,7 @@
           <a:lstStyle>
             <a:lvl1pPr marL="0" indent="0">
               <a:buNone/>
-              <a:defRPr sz="1518">
+              <a:defRPr sz="1392">
                 <a:solidFill>
                   <a:schemeClr val="tx1">
                     <a:tint val="75000"/>
@@ -1343,9 +1343,9 @@
                 </a:solidFill>
               </a:defRPr>
             </a:lvl1pPr>
-            <a:lvl2pPr marL="289133" indent="0">
+            <a:lvl2pPr marL="265130" indent="0">
               <a:buNone/>
-              <a:defRPr sz="1265">
+              <a:defRPr sz="1160">
                 <a:solidFill>
                   <a:schemeClr val="tx1">
                     <a:tint val="75000"/>
@@ -1353,9 +1353,9 @@
                 </a:solidFill>
               </a:defRPr>
             </a:lvl2pPr>
-            <a:lvl3pPr marL="578267" indent="0">
+            <a:lvl3pPr marL="530261" indent="0">
               <a:buNone/>
-              <a:defRPr sz="1138">
+              <a:defRPr sz="1044">
                 <a:solidFill>
                   <a:schemeClr val="tx1">
                     <a:tint val="75000"/>
@@ -1363,9 +1363,9 @@
                 </a:solidFill>
               </a:defRPr>
             </a:lvl3pPr>
-            <a:lvl4pPr marL="867400" indent="0">
+            <a:lvl4pPr marL="795391" indent="0">
               <a:buNone/>
-              <a:defRPr sz="1012">
+              <a:defRPr sz="928">
                 <a:solidFill>
                   <a:schemeClr val="tx1">
                     <a:tint val="75000"/>
@@ -1373,9 +1373,9 @@
                 </a:solidFill>
               </a:defRPr>
             </a:lvl4pPr>
-            <a:lvl5pPr marL="1156533" indent="0">
+            <a:lvl5pPr marL="1060521" indent="0">
               <a:buNone/>
-              <a:defRPr sz="1012">
+              <a:defRPr sz="928">
                 <a:solidFill>
                   <a:schemeClr val="tx1">
                     <a:tint val="75000"/>
@@ -1383,9 +1383,9 @@
                 </a:solidFill>
               </a:defRPr>
             </a:lvl5pPr>
-            <a:lvl6pPr marL="1445666" indent="0">
+            <a:lvl6pPr marL="1325651" indent="0">
               <a:buNone/>
-              <a:defRPr sz="1012">
+              <a:defRPr sz="928">
                 <a:solidFill>
                   <a:schemeClr val="tx1">
                     <a:tint val="75000"/>
@@ -1393,9 +1393,9 @@
                 </a:solidFill>
               </a:defRPr>
             </a:lvl6pPr>
-            <a:lvl7pPr marL="1734800" indent="0">
+            <a:lvl7pPr marL="1590782" indent="0">
               <a:buNone/>
-              <a:defRPr sz="1012">
+              <a:defRPr sz="928">
                 <a:solidFill>
                   <a:schemeClr val="tx1">
                     <a:tint val="75000"/>
@@ -1403,9 +1403,9 @@
                 </a:solidFill>
               </a:defRPr>
             </a:lvl7pPr>
-            <a:lvl8pPr marL="2023933" indent="0">
+            <a:lvl8pPr marL="1855912" indent="0">
               <a:buNone/>
-              <a:defRPr sz="1012">
+              <a:defRPr sz="928">
                 <a:solidFill>
                   <a:schemeClr val="tx1">
                     <a:tint val="75000"/>
@@ -1413,9 +1413,9 @@
                 </a:solidFill>
               </a:defRPr>
             </a:lvl8pPr>
-            <a:lvl9pPr marL="2313066" indent="0">
+            <a:lvl9pPr marL="2121042" indent="0">
               <a:buNone/>
-              <a:defRPr sz="1012">
+              <a:defRPr sz="928">
                 <a:solidFill>
                   <a:schemeClr val="tx1">
                     <a:tint val="75000"/>
@@ -1450,7 +1450,7 @@
           <a:p>
             <a:fld id="{A627DF43-A246-43EE-926C-71914852C54A}" type="datetimeFigureOut">
               <a:rPr lang="zh-CN" altLang="en-US" smtClean="0"/>
-              <a:t>2020/12/10</a:t>
+              <a:t>2020/12/13</a:t>
             </a:fld>
             <a:endParaRPr lang="zh-CN" altLang="en-US"/>
           </a:p>
@@ -1501,7 +1501,7 @@
     </p:spTree>
     <p:extLst>
       <p:ext uri="{BB962C8B-B14F-4D97-AF65-F5344CB8AC3E}">
-        <p14:creationId xmlns:p14="http://schemas.microsoft.com/office/powerpoint/2010/main" val="2870281393"/>
+        <p14:creationId xmlns:p14="http://schemas.microsoft.com/office/powerpoint/2010/main" val="1493951764"/>
       </p:ext>
     </p:extLst>
   </p:cSld>
@@ -1563,8 +1563,8 @@
         </p:nvSpPr>
         <p:spPr>
           <a:xfrm>
-            <a:off x="813425" y="1154539"/>
-            <a:ext cx="5028446" cy="2751818"/>
+            <a:off x="813425" y="1058609"/>
+            <a:ext cx="5028446" cy="2523172"/>
           </a:xfrm>
         </p:spPr>
         <p:txBody>
@@ -1620,8 +1620,8 @@
         </p:nvSpPr>
         <p:spPr>
           <a:xfrm>
-            <a:off x="5989767" y="1154539"/>
-            <a:ext cx="5028446" cy="2751818"/>
+            <a:off x="5989767" y="1058609"/>
+            <a:ext cx="5028446" cy="2523172"/>
           </a:xfrm>
         </p:spPr>
         <p:txBody>
@@ -1682,7 +1682,7 @@
           <a:p>
             <a:fld id="{A627DF43-A246-43EE-926C-71914852C54A}" type="datetimeFigureOut">
               <a:rPr lang="zh-CN" altLang="en-US" smtClean="0"/>
-              <a:t>2020/12/10</a:t>
+              <a:t>2020/12/13</a:t>
             </a:fld>
             <a:endParaRPr lang="zh-CN" altLang="en-US"/>
           </a:p>
@@ -1733,7 +1733,7 @@
     </p:spTree>
     <p:extLst>
       <p:ext uri="{BB962C8B-B14F-4D97-AF65-F5344CB8AC3E}">
-        <p14:creationId xmlns:p14="http://schemas.microsoft.com/office/powerpoint/2010/main" val="2657679266"/>
+        <p14:creationId xmlns:p14="http://schemas.microsoft.com/office/powerpoint/2010/main" val="2622243864"/>
       </p:ext>
     </p:extLst>
   </p:cSld>
@@ -1772,8 +1772,8 @@
         </p:nvSpPr>
         <p:spPr>
           <a:xfrm>
-            <a:off x="814966" y="230908"/>
-            <a:ext cx="10204788" cy="838296"/>
+            <a:off x="814966" y="211722"/>
+            <a:ext cx="10204788" cy="768643"/>
           </a:xfrm>
         </p:spPr>
         <p:txBody>
@@ -1800,8 +1800,8 @@
         </p:nvSpPr>
         <p:spPr>
           <a:xfrm>
-            <a:off x="814967" y="1063180"/>
-            <a:ext cx="5005337" cy="521048"/>
+            <a:off x="814967" y="974841"/>
+            <a:ext cx="5005337" cy="477755"/>
           </a:xfrm>
         </p:spPr>
         <p:txBody>
@@ -1809,39 +1809,39 @@
           <a:lstStyle>
             <a:lvl1pPr marL="0" indent="0">
               <a:buNone/>
-              <a:defRPr sz="1518" b="1"/>
+              <a:defRPr sz="1392" b="1"/>
             </a:lvl1pPr>
-            <a:lvl2pPr marL="289133" indent="0">
+            <a:lvl2pPr marL="265130" indent="0">
               <a:buNone/>
-              <a:defRPr sz="1265" b="1"/>
+              <a:defRPr sz="1160" b="1"/>
             </a:lvl2pPr>
-            <a:lvl3pPr marL="578267" indent="0">
+            <a:lvl3pPr marL="530261" indent="0">
               <a:buNone/>
-              <a:defRPr sz="1138" b="1"/>
+              <a:defRPr sz="1044" b="1"/>
             </a:lvl3pPr>
-            <a:lvl4pPr marL="867400" indent="0">
+            <a:lvl4pPr marL="795391" indent="0">
               <a:buNone/>
-              <a:defRPr sz="1012" b="1"/>
+              <a:defRPr sz="928" b="1"/>
             </a:lvl4pPr>
-            <a:lvl5pPr marL="1156533" indent="0">
+            <a:lvl5pPr marL="1060521" indent="0">
               <a:buNone/>
-              <a:defRPr sz="1012" b="1"/>
+              <a:defRPr sz="928" b="1"/>
             </a:lvl5pPr>
-            <a:lvl6pPr marL="1445666" indent="0">
+            <a:lvl6pPr marL="1325651" indent="0">
               <a:buNone/>
-              <a:defRPr sz="1012" b="1"/>
+              <a:defRPr sz="928" b="1"/>
             </a:lvl6pPr>
-            <a:lvl7pPr marL="1734800" indent="0">
+            <a:lvl7pPr marL="1590782" indent="0">
               <a:buNone/>
-              <a:defRPr sz="1012" b="1"/>
+              <a:defRPr sz="928" b="1"/>
             </a:lvl7pPr>
-            <a:lvl8pPr marL="2023933" indent="0">
+            <a:lvl8pPr marL="1855912" indent="0">
               <a:buNone/>
-              <a:defRPr sz="1012" b="1"/>
+              <a:defRPr sz="928" b="1"/>
             </a:lvl8pPr>
-            <a:lvl9pPr marL="2313066" indent="0">
+            <a:lvl9pPr marL="2121042" indent="0">
               <a:buNone/>
-              <a:defRPr sz="1012" b="1"/>
+              <a:defRPr sz="928" b="1"/>
             </a:lvl9pPr>
           </a:lstStyle>
           <a:p>
@@ -1865,8 +1865,8 @@
         </p:nvSpPr>
         <p:spPr>
           <a:xfrm>
-            <a:off x="814967" y="1584228"/>
-            <a:ext cx="5005337" cy="2330161"/>
+            <a:off x="814967" y="1452596"/>
+            <a:ext cx="5005337" cy="2136550"/>
           </a:xfrm>
         </p:spPr>
         <p:txBody>
@@ -1922,8 +1922,8 @@
         </p:nvSpPr>
         <p:spPr>
           <a:xfrm>
-            <a:off x="5989767" y="1063180"/>
-            <a:ext cx="5029987" cy="521048"/>
+            <a:off x="5989767" y="974841"/>
+            <a:ext cx="5029987" cy="477755"/>
           </a:xfrm>
         </p:spPr>
         <p:txBody>
@@ -1931,39 +1931,39 @@
           <a:lstStyle>
             <a:lvl1pPr marL="0" indent="0">
               <a:buNone/>
-              <a:defRPr sz="1518" b="1"/>
+              <a:defRPr sz="1392" b="1"/>
             </a:lvl1pPr>
-            <a:lvl2pPr marL="289133" indent="0">
+            <a:lvl2pPr marL="265130" indent="0">
               <a:buNone/>
-              <a:defRPr sz="1265" b="1"/>
+              <a:defRPr sz="1160" b="1"/>
             </a:lvl2pPr>
-            <a:lvl3pPr marL="578267" indent="0">
+            <a:lvl3pPr marL="530261" indent="0">
               <a:buNone/>
-              <a:defRPr sz="1138" b="1"/>
+              <a:defRPr sz="1044" b="1"/>
             </a:lvl3pPr>
-            <a:lvl4pPr marL="867400" indent="0">
+            <a:lvl4pPr marL="795391" indent="0">
               <a:buNone/>
-              <a:defRPr sz="1012" b="1"/>
+              <a:defRPr sz="928" b="1"/>
             </a:lvl4pPr>
-            <a:lvl5pPr marL="1156533" indent="0">
+            <a:lvl5pPr marL="1060521" indent="0">
               <a:buNone/>
-              <a:defRPr sz="1012" b="1"/>
+              <a:defRPr sz="928" b="1"/>
             </a:lvl5pPr>
-            <a:lvl6pPr marL="1445666" indent="0">
+            <a:lvl6pPr marL="1325651" indent="0">
               <a:buNone/>
-              <a:defRPr sz="1012" b="1"/>
+              <a:defRPr sz="928" b="1"/>
             </a:lvl6pPr>
-            <a:lvl7pPr marL="1734800" indent="0">
+            <a:lvl7pPr marL="1590782" indent="0">
               <a:buNone/>
-              <a:defRPr sz="1012" b="1"/>
+              <a:defRPr sz="928" b="1"/>
             </a:lvl7pPr>
-            <a:lvl8pPr marL="2023933" indent="0">
+            <a:lvl8pPr marL="1855912" indent="0">
               <a:buNone/>
-              <a:defRPr sz="1012" b="1"/>
+              <a:defRPr sz="928" b="1"/>
             </a:lvl8pPr>
-            <a:lvl9pPr marL="2313066" indent="0">
+            <a:lvl9pPr marL="2121042" indent="0">
               <a:buNone/>
-              <a:defRPr sz="1012" b="1"/>
+              <a:defRPr sz="928" b="1"/>
             </a:lvl9pPr>
           </a:lstStyle>
           <a:p>
@@ -1987,8 +1987,8 @@
         </p:nvSpPr>
         <p:spPr>
           <a:xfrm>
-            <a:off x="5989767" y="1584228"/>
-            <a:ext cx="5029987" cy="2330161"/>
+            <a:off x="5989767" y="1452596"/>
+            <a:ext cx="5029987" cy="2136550"/>
           </a:xfrm>
         </p:spPr>
         <p:txBody>
@@ -2049,7 +2049,7 @@
           <a:p>
             <a:fld id="{A627DF43-A246-43EE-926C-71914852C54A}" type="datetimeFigureOut">
               <a:rPr lang="zh-CN" altLang="en-US" smtClean="0"/>
-              <a:t>2020/12/10</a:t>
+              <a:t>2020/12/13</a:t>
             </a:fld>
             <a:endParaRPr lang="zh-CN" altLang="en-US"/>
           </a:p>
@@ -2100,7 +2100,7 @@
     </p:spTree>
     <p:extLst>
       <p:ext uri="{BB962C8B-B14F-4D97-AF65-F5344CB8AC3E}">
-        <p14:creationId xmlns:p14="http://schemas.microsoft.com/office/powerpoint/2010/main" val="3893960979"/>
+        <p14:creationId xmlns:p14="http://schemas.microsoft.com/office/powerpoint/2010/main" val="2535164194"/>
       </p:ext>
     </p:extLst>
   </p:cSld>
@@ -2167,7 +2167,7 @@
           <a:p>
             <a:fld id="{A627DF43-A246-43EE-926C-71914852C54A}" type="datetimeFigureOut">
               <a:rPr lang="zh-CN" altLang="en-US" smtClean="0"/>
-              <a:t>2020/12/10</a:t>
+              <a:t>2020/12/13</a:t>
             </a:fld>
             <a:endParaRPr lang="zh-CN" altLang="en-US"/>
           </a:p>
@@ -2218,7 +2218,7 @@
     </p:spTree>
     <p:extLst>
       <p:ext uri="{BB962C8B-B14F-4D97-AF65-F5344CB8AC3E}">
-        <p14:creationId xmlns:p14="http://schemas.microsoft.com/office/powerpoint/2010/main" val="3441805853"/>
+        <p14:creationId xmlns:p14="http://schemas.microsoft.com/office/powerpoint/2010/main" val="3106757463"/>
       </p:ext>
     </p:extLst>
   </p:cSld>
@@ -2262,7 +2262,7 @@
           <a:p>
             <a:fld id="{A627DF43-A246-43EE-926C-71914852C54A}" type="datetimeFigureOut">
               <a:rPr lang="zh-CN" altLang="en-US" smtClean="0"/>
-              <a:t>2020/12/10</a:t>
+              <a:t>2020/12/13</a:t>
             </a:fld>
             <a:endParaRPr lang="zh-CN" altLang="en-US"/>
           </a:p>
@@ -2313,7 +2313,7 @@
     </p:spTree>
     <p:extLst>
       <p:ext uri="{BB962C8B-B14F-4D97-AF65-F5344CB8AC3E}">
-        <p14:creationId xmlns:p14="http://schemas.microsoft.com/office/powerpoint/2010/main" val="4012392629"/>
+        <p14:creationId xmlns:p14="http://schemas.microsoft.com/office/powerpoint/2010/main" val="2764100879"/>
       </p:ext>
     </p:extLst>
   </p:cSld>
@@ -2352,15 +2352,15 @@
         </p:nvSpPr>
         <p:spPr>
           <a:xfrm>
-            <a:off x="814967" y="289137"/>
-            <a:ext cx="3816011" cy="1011978"/>
+            <a:off x="814967" y="265112"/>
+            <a:ext cx="3816011" cy="927894"/>
           </a:xfrm>
         </p:spPr>
         <p:txBody>
           <a:bodyPr anchor="b"/>
           <a:lstStyle>
             <a:lvl1pPr>
-              <a:defRPr sz="2024"/>
+              <a:defRPr sz="1856"/>
             </a:lvl1pPr>
           </a:lstStyle>
           <a:p>
@@ -2384,39 +2384,39 @@
         </p:nvSpPr>
         <p:spPr>
           <a:xfrm>
-            <a:off x="5029987" y="624455"/>
-            <a:ext cx="5989767" cy="3082117"/>
+            <a:off x="5029987" y="572570"/>
+            <a:ext cx="5989767" cy="2826026"/>
           </a:xfrm>
         </p:spPr>
         <p:txBody>
           <a:bodyPr/>
           <a:lstStyle>
             <a:lvl1pPr>
-              <a:defRPr sz="2024"/>
+              <a:defRPr sz="1856"/>
             </a:lvl1pPr>
             <a:lvl2pPr>
-              <a:defRPr sz="1771"/>
+              <a:defRPr sz="1624"/>
             </a:lvl2pPr>
             <a:lvl3pPr>
-              <a:defRPr sz="1518"/>
+              <a:defRPr sz="1392"/>
             </a:lvl3pPr>
             <a:lvl4pPr>
-              <a:defRPr sz="1265"/>
+              <a:defRPr sz="1160"/>
             </a:lvl4pPr>
             <a:lvl5pPr>
-              <a:defRPr sz="1265"/>
+              <a:defRPr sz="1160"/>
             </a:lvl5pPr>
             <a:lvl6pPr>
-              <a:defRPr sz="1265"/>
+              <a:defRPr sz="1160"/>
             </a:lvl6pPr>
             <a:lvl7pPr>
-              <a:defRPr sz="1265"/>
+              <a:defRPr sz="1160"/>
             </a:lvl7pPr>
             <a:lvl8pPr>
-              <a:defRPr sz="1265"/>
+              <a:defRPr sz="1160"/>
             </a:lvl8pPr>
             <a:lvl9pPr>
-              <a:defRPr sz="1265"/>
+              <a:defRPr sz="1160"/>
             </a:lvl9pPr>
           </a:lstStyle>
           <a:p>
@@ -2469,8 +2469,8 @@
         </p:nvSpPr>
         <p:spPr>
           <a:xfrm>
-            <a:off x="814967" y="1301115"/>
-            <a:ext cx="3816011" cy="2410476"/>
+            <a:off x="814967" y="1193006"/>
+            <a:ext cx="3816011" cy="2210192"/>
           </a:xfrm>
         </p:spPr>
         <p:txBody>
@@ -2478,39 +2478,39 @@
           <a:lstStyle>
             <a:lvl1pPr marL="0" indent="0">
               <a:buNone/>
-              <a:defRPr sz="1012"/>
+              <a:defRPr sz="928"/>
             </a:lvl1pPr>
-            <a:lvl2pPr marL="289133" indent="0">
+            <a:lvl2pPr marL="265130" indent="0">
               <a:buNone/>
-              <a:defRPr sz="885"/>
+              <a:defRPr sz="812"/>
             </a:lvl2pPr>
-            <a:lvl3pPr marL="578267" indent="0">
+            <a:lvl3pPr marL="530261" indent="0">
               <a:buNone/>
-              <a:defRPr sz="759"/>
+              <a:defRPr sz="696"/>
             </a:lvl3pPr>
-            <a:lvl4pPr marL="867400" indent="0">
+            <a:lvl4pPr marL="795391" indent="0">
               <a:buNone/>
-              <a:defRPr sz="632"/>
+              <a:defRPr sz="580"/>
             </a:lvl4pPr>
-            <a:lvl5pPr marL="1156533" indent="0">
+            <a:lvl5pPr marL="1060521" indent="0">
               <a:buNone/>
-              <a:defRPr sz="632"/>
+              <a:defRPr sz="580"/>
             </a:lvl5pPr>
-            <a:lvl6pPr marL="1445666" indent="0">
+            <a:lvl6pPr marL="1325651" indent="0">
               <a:buNone/>
-              <a:defRPr sz="632"/>
+              <a:defRPr sz="580"/>
             </a:lvl6pPr>
-            <a:lvl7pPr marL="1734800" indent="0">
+            <a:lvl7pPr marL="1590782" indent="0">
               <a:buNone/>
-              <a:defRPr sz="632"/>
+              <a:defRPr sz="580"/>
             </a:lvl7pPr>
-            <a:lvl8pPr marL="2023933" indent="0">
+            <a:lvl8pPr marL="1855912" indent="0">
               <a:buNone/>
-              <a:defRPr sz="632"/>
+              <a:defRPr sz="580"/>
             </a:lvl8pPr>
-            <a:lvl9pPr marL="2313066" indent="0">
+            <a:lvl9pPr marL="2121042" indent="0">
               <a:buNone/>
-              <a:defRPr sz="632"/>
+              <a:defRPr sz="580"/>
             </a:lvl9pPr>
           </a:lstStyle>
           <a:p>
@@ -2539,7 +2539,7 @@
           <a:p>
             <a:fld id="{A627DF43-A246-43EE-926C-71914852C54A}" type="datetimeFigureOut">
               <a:rPr lang="zh-CN" altLang="en-US" smtClean="0"/>
-              <a:t>2020/12/10</a:t>
+              <a:t>2020/12/13</a:t>
             </a:fld>
             <a:endParaRPr lang="zh-CN" altLang="en-US"/>
           </a:p>
@@ -2590,7 +2590,7 @@
     </p:spTree>
     <p:extLst>
       <p:ext uri="{BB962C8B-B14F-4D97-AF65-F5344CB8AC3E}">
-        <p14:creationId xmlns:p14="http://schemas.microsoft.com/office/powerpoint/2010/main" val="3189645383"/>
+        <p14:creationId xmlns:p14="http://schemas.microsoft.com/office/powerpoint/2010/main" val="3926229898"/>
       </p:ext>
     </p:extLst>
   </p:cSld>
@@ -2629,15 +2629,15 @@
         </p:nvSpPr>
         <p:spPr>
           <a:xfrm>
-            <a:off x="814967" y="289137"/>
-            <a:ext cx="3816011" cy="1011978"/>
+            <a:off x="814967" y="265112"/>
+            <a:ext cx="3816011" cy="927894"/>
           </a:xfrm>
         </p:spPr>
         <p:txBody>
           <a:bodyPr anchor="b"/>
           <a:lstStyle>
             <a:lvl1pPr>
-              <a:defRPr sz="2024"/>
+              <a:defRPr sz="1856"/>
             </a:lvl1pPr>
           </a:lstStyle>
           <a:p>
@@ -2661,8 +2661,8 @@
         </p:nvSpPr>
         <p:spPr>
           <a:xfrm>
-            <a:off x="5029987" y="624455"/>
-            <a:ext cx="5989767" cy="3082117"/>
+            <a:off x="5029987" y="572570"/>
+            <a:ext cx="5989767" cy="2826026"/>
           </a:xfrm>
         </p:spPr>
         <p:txBody>
@@ -2670,39 +2670,39 @@
           <a:lstStyle>
             <a:lvl1pPr marL="0" indent="0">
               <a:buNone/>
-              <a:defRPr sz="2024"/>
+              <a:defRPr sz="1856"/>
             </a:lvl1pPr>
-            <a:lvl2pPr marL="289133" indent="0">
+            <a:lvl2pPr marL="265130" indent="0">
               <a:buNone/>
-              <a:defRPr sz="1771"/>
+              <a:defRPr sz="1624"/>
             </a:lvl2pPr>
-            <a:lvl3pPr marL="578267" indent="0">
+            <a:lvl3pPr marL="530261" indent="0">
               <a:buNone/>
-              <a:defRPr sz="1518"/>
+              <a:defRPr sz="1392"/>
             </a:lvl3pPr>
-            <a:lvl4pPr marL="867400" indent="0">
+            <a:lvl4pPr marL="795391" indent="0">
               <a:buNone/>
-              <a:defRPr sz="1265"/>
+              <a:defRPr sz="1160"/>
             </a:lvl4pPr>
-            <a:lvl5pPr marL="1156533" indent="0">
+            <a:lvl5pPr marL="1060521" indent="0">
               <a:buNone/>
-              <a:defRPr sz="1265"/>
+              <a:defRPr sz="1160"/>
             </a:lvl5pPr>
-            <a:lvl6pPr marL="1445666" indent="0">
+            <a:lvl6pPr marL="1325651" indent="0">
               <a:buNone/>
-              <a:defRPr sz="1265"/>
+              <a:defRPr sz="1160"/>
             </a:lvl6pPr>
-            <a:lvl7pPr marL="1734800" indent="0">
+            <a:lvl7pPr marL="1590782" indent="0">
               <a:buNone/>
-              <a:defRPr sz="1265"/>
+              <a:defRPr sz="1160"/>
             </a:lvl7pPr>
-            <a:lvl8pPr marL="2023933" indent="0">
+            <a:lvl8pPr marL="1855912" indent="0">
               <a:buNone/>
-              <a:defRPr sz="1265"/>
+              <a:defRPr sz="1160"/>
             </a:lvl8pPr>
-            <a:lvl9pPr marL="2313066" indent="0">
+            <a:lvl9pPr marL="2121042" indent="0">
               <a:buNone/>
-              <a:defRPr sz="1265"/>
+              <a:defRPr sz="1160"/>
             </a:lvl9pPr>
           </a:lstStyle>
           <a:p>
@@ -2726,8 +2726,8 @@
         </p:nvSpPr>
         <p:spPr>
           <a:xfrm>
-            <a:off x="814967" y="1301115"/>
-            <a:ext cx="3816011" cy="2410476"/>
+            <a:off x="814967" y="1193006"/>
+            <a:ext cx="3816011" cy="2210192"/>
           </a:xfrm>
         </p:spPr>
         <p:txBody>
@@ -2735,39 +2735,39 @@
           <a:lstStyle>
             <a:lvl1pPr marL="0" indent="0">
               <a:buNone/>
-              <a:defRPr sz="1012"/>
+              <a:defRPr sz="928"/>
             </a:lvl1pPr>
-            <a:lvl2pPr marL="289133" indent="0">
+            <a:lvl2pPr marL="265130" indent="0">
               <a:buNone/>
-              <a:defRPr sz="885"/>
+              <a:defRPr sz="812"/>
             </a:lvl2pPr>
-            <a:lvl3pPr marL="578267" indent="0">
+            <a:lvl3pPr marL="530261" indent="0">
               <a:buNone/>
-              <a:defRPr sz="759"/>
+              <a:defRPr sz="696"/>
             </a:lvl3pPr>
-            <a:lvl4pPr marL="867400" indent="0">
+            <a:lvl4pPr marL="795391" indent="0">
               <a:buNone/>
-              <a:defRPr sz="632"/>
+              <a:defRPr sz="580"/>
             </a:lvl4pPr>
-            <a:lvl5pPr marL="1156533" indent="0">
+            <a:lvl5pPr marL="1060521" indent="0">
               <a:buNone/>
-              <a:defRPr sz="632"/>
+              <a:defRPr sz="580"/>
             </a:lvl5pPr>
-            <a:lvl6pPr marL="1445666" indent="0">
+            <a:lvl6pPr marL="1325651" indent="0">
               <a:buNone/>
-              <a:defRPr sz="632"/>
+              <a:defRPr sz="580"/>
             </a:lvl6pPr>
-            <a:lvl7pPr marL="1734800" indent="0">
+            <a:lvl7pPr marL="1590782" indent="0">
               <a:buNone/>
-              <a:defRPr sz="632"/>
+              <a:defRPr sz="580"/>
             </a:lvl7pPr>
-            <a:lvl8pPr marL="2023933" indent="0">
+            <a:lvl8pPr marL="1855912" indent="0">
               <a:buNone/>
-              <a:defRPr sz="632"/>
+              <a:defRPr sz="580"/>
             </a:lvl8pPr>
-            <a:lvl9pPr marL="2313066" indent="0">
+            <a:lvl9pPr marL="2121042" indent="0">
               <a:buNone/>
-              <a:defRPr sz="632"/>
+              <a:defRPr sz="580"/>
             </a:lvl9pPr>
           </a:lstStyle>
           <a:p>
@@ -2796,7 +2796,7 @@
           <a:p>
             <a:fld id="{A627DF43-A246-43EE-926C-71914852C54A}" type="datetimeFigureOut">
               <a:rPr lang="zh-CN" altLang="en-US" smtClean="0"/>
-              <a:t>2020/12/10</a:t>
+              <a:t>2020/12/13</a:t>
             </a:fld>
             <a:endParaRPr lang="zh-CN" altLang="en-US"/>
           </a:p>
@@ -2847,7 +2847,7 @@
     </p:spTree>
     <p:extLst>
       <p:ext uri="{BB962C8B-B14F-4D97-AF65-F5344CB8AC3E}">
-        <p14:creationId xmlns:p14="http://schemas.microsoft.com/office/powerpoint/2010/main" val="3826304893"/>
+        <p14:creationId xmlns:p14="http://schemas.microsoft.com/office/powerpoint/2010/main" val="2218358788"/>
       </p:ext>
     </p:extLst>
   </p:cSld>
@@ -2891,8 +2891,8 @@
         </p:nvSpPr>
         <p:spPr>
           <a:xfrm>
-            <a:off x="813425" y="230908"/>
-            <a:ext cx="10204788" cy="838296"/>
+            <a:off x="813425" y="211722"/>
+            <a:ext cx="10204788" cy="768643"/>
           </a:xfrm>
           <a:prstGeom prst="rect">
             <a:avLst/>
@@ -2924,8 +2924,8 @@
         </p:nvSpPr>
         <p:spPr>
           <a:xfrm>
-            <a:off x="813425" y="1154539"/>
-            <a:ext cx="10204788" cy="2751818"/>
+            <a:off x="813425" y="1058609"/>
+            <a:ext cx="10204788" cy="2523172"/>
           </a:xfrm>
           <a:prstGeom prst="rect">
             <a:avLst/>
@@ -2986,8 +2986,8 @@
         </p:nvSpPr>
         <p:spPr>
           <a:xfrm>
-            <a:off x="813425" y="4019803"/>
-            <a:ext cx="2662119" cy="230908"/>
+            <a:off x="813425" y="3685801"/>
+            <a:ext cx="2662119" cy="211722"/>
           </a:xfrm>
           <a:prstGeom prst="rect">
             <a:avLst/>
@@ -2997,7 +2997,7 @@
           <a:bodyPr vert="horz" lIns="91440" tIns="45720" rIns="91440" bIns="45720" rtlCol="0" anchor="ctr"/>
           <a:lstStyle>
             <a:lvl1pPr algn="l">
-              <a:defRPr sz="759">
+              <a:defRPr sz="696">
                 <a:solidFill>
                   <a:schemeClr val="tx1">
                     <a:tint val="75000"/>
@@ -3009,7 +3009,7 @@
           <a:p>
             <a:fld id="{A627DF43-A246-43EE-926C-71914852C54A}" type="datetimeFigureOut">
               <a:rPr lang="zh-CN" altLang="en-US" smtClean="0"/>
-              <a:t>2020/12/10</a:t>
+              <a:t>2020/12/13</a:t>
             </a:fld>
             <a:endParaRPr lang="zh-CN" altLang="en-US"/>
           </a:p>
@@ -3027,8 +3027,8 @@
         </p:nvSpPr>
         <p:spPr>
           <a:xfrm>
-            <a:off x="3919230" y="4019803"/>
-            <a:ext cx="3993178" cy="230908"/>
+            <a:off x="3919230" y="3685801"/>
+            <a:ext cx="3993178" cy="211722"/>
           </a:xfrm>
           <a:prstGeom prst="rect">
             <a:avLst/>
@@ -3038,7 +3038,7 @@
           <a:bodyPr vert="horz" lIns="91440" tIns="45720" rIns="91440" bIns="45720" rtlCol="0" anchor="ctr"/>
           <a:lstStyle>
             <a:lvl1pPr algn="ctr">
-              <a:defRPr sz="759">
+              <a:defRPr sz="696">
                 <a:solidFill>
                   <a:schemeClr val="tx1">
                     <a:tint val="75000"/>
@@ -3064,8 +3064,8 @@
         </p:nvSpPr>
         <p:spPr>
           <a:xfrm>
-            <a:off x="8356094" y="4019803"/>
-            <a:ext cx="2662119" cy="230908"/>
+            <a:off x="8356094" y="3685801"/>
+            <a:ext cx="2662119" cy="211722"/>
           </a:xfrm>
           <a:prstGeom prst="rect">
             <a:avLst/>
@@ -3075,7 +3075,7 @@
           <a:bodyPr vert="horz" lIns="91440" tIns="45720" rIns="91440" bIns="45720" rtlCol="0" anchor="ctr"/>
           <a:lstStyle>
             <a:lvl1pPr algn="r">
-              <a:defRPr sz="759">
+              <a:defRPr sz="696">
                 <a:solidFill>
                   <a:schemeClr val="tx1">
                     <a:tint val="75000"/>
@@ -3096,27 +3096,27 @@
     </p:spTree>
     <p:extLst>
       <p:ext uri="{BB962C8B-B14F-4D97-AF65-F5344CB8AC3E}">
-        <p14:creationId xmlns:p14="http://schemas.microsoft.com/office/powerpoint/2010/main" val="493184758"/>
+        <p14:creationId xmlns:p14="http://schemas.microsoft.com/office/powerpoint/2010/main" val="2124446154"/>
       </p:ext>
     </p:extLst>
   </p:cSld>
   <p:clrMap bg1="lt1" tx1="dk1" bg2="lt2" tx2="dk2" accent1="accent1" accent2="accent2" accent3="accent3" accent4="accent4" accent5="accent5" accent6="accent6" hlink="hlink" folHlink="folHlink"/>
   <p:sldLayoutIdLst>
-    <p:sldLayoutId id="2147483685" r:id="rId1"/>
-    <p:sldLayoutId id="2147483686" r:id="rId2"/>
-    <p:sldLayoutId id="2147483687" r:id="rId3"/>
-    <p:sldLayoutId id="2147483688" r:id="rId4"/>
-    <p:sldLayoutId id="2147483689" r:id="rId5"/>
-    <p:sldLayoutId id="2147483690" r:id="rId6"/>
-    <p:sldLayoutId id="2147483691" r:id="rId7"/>
-    <p:sldLayoutId id="2147483692" r:id="rId8"/>
-    <p:sldLayoutId id="2147483693" r:id="rId9"/>
-    <p:sldLayoutId id="2147483694" r:id="rId10"/>
-    <p:sldLayoutId id="2147483695" r:id="rId11"/>
+    <p:sldLayoutId id="2147483697" r:id="rId1"/>
+    <p:sldLayoutId id="2147483698" r:id="rId2"/>
+    <p:sldLayoutId id="2147483699" r:id="rId3"/>
+    <p:sldLayoutId id="2147483700" r:id="rId4"/>
+    <p:sldLayoutId id="2147483701" r:id="rId5"/>
+    <p:sldLayoutId id="2147483702" r:id="rId6"/>
+    <p:sldLayoutId id="2147483703" r:id="rId7"/>
+    <p:sldLayoutId id="2147483704" r:id="rId8"/>
+    <p:sldLayoutId id="2147483705" r:id="rId9"/>
+    <p:sldLayoutId id="2147483706" r:id="rId10"/>
+    <p:sldLayoutId id="2147483707" r:id="rId11"/>
   </p:sldLayoutIdLst>
   <p:txStyles>
     <p:titleStyle>
-      <a:lvl1pPr algn="l" defTabSz="578267" rtl="0" eaLnBrk="1" latinLnBrk="0" hangingPunct="1">
+      <a:lvl1pPr algn="l" defTabSz="530261" rtl="0" eaLnBrk="1" latinLnBrk="0" hangingPunct="1">
         <a:lnSpc>
           <a:spcPct val="90000"/>
         </a:lnSpc>
@@ -3124,7 +3124,7 @@
           <a:spcPct val="0"/>
         </a:spcBef>
         <a:buNone/>
-        <a:defRPr sz="2783" kern="1200">
+        <a:defRPr sz="2552" kern="1200">
           <a:solidFill>
             <a:schemeClr val="tx1"/>
           </a:solidFill>
@@ -3135,16 +3135,16 @@
       </a:lvl1pPr>
     </p:titleStyle>
     <p:bodyStyle>
-      <a:lvl1pPr marL="144567" indent="-144567" algn="l" defTabSz="578267" rtl="0" eaLnBrk="1" latinLnBrk="0" hangingPunct="1">
+      <a:lvl1pPr marL="132565" indent="-132565" algn="l" defTabSz="530261" rtl="0" eaLnBrk="1" latinLnBrk="0" hangingPunct="1">
         <a:lnSpc>
           <a:spcPct val="90000"/>
         </a:lnSpc>
         <a:spcBef>
-          <a:spcPts val="632"/>
+          <a:spcPts val="580"/>
         </a:spcBef>
         <a:buFont typeface="Arial" panose="020B0604020202020204" pitchFamily="34" charset="0"/>
         <a:buChar char="•"/>
-        <a:defRPr sz="1771" kern="1200">
+        <a:defRPr sz="1624" kern="1200">
           <a:solidFill>
             <a:schemeClr val="tx1"/>
           </a:solidFill>
@@ -3153,16 +3153,16 @@
           <a:cs typeface="+mn-cs"/>
         </a:defRPr>
       </a:lvl1pPr>
-      <a:lvl2pPr marL="433700" indent="-144567" algn="l" defTabSz="578267" rtl="0" eaLnBrk="1" latinLnBrk="0" hangingPunct="1">
+      <a:lvl2pPr marL="397695" indent="-132565" algn="l" defTabSz="530261" rtl="0" eaLnBrk="1" latinLnBrk="0" hangingPunct="1">
         <a:lnSpc>
           <a:spcPct val="90000"/>
         </a:lnSpc>
         <a:spcBef>
-          <a:spcPts val="316"/>
+          <a:spcPts val="290"/>
         </a:spcBef>
         <a:buFont typeface="Arial" panose="020B0604020202020204" pitchFamily="34" charset="0"/>
         <a:buChar char="•"/>
-        <a:defRPr sz="1518" kern="1200">
+        <a:defRPr sz="1392" kern="1200">
           <a:solidFill>
             <a:schemeClr val="tx1"/>
           </a:solidFill>
@@ -3171,16 +3171,16 @@
           <a:cs typeface="+mn-cs"/>
         </a:defRPr>
       </a:lvl2pPr>
-      <a:lvl3pPr marL="722833" indent="-144567" algn="l" defTabSz="578267" rtl="0" eaLnBrk="1" latinLnBrk="0" hangingPunct="1">
+      <a:lvl3pPr marL="662826" indent="-132565" algn="l" defTabSz="530261" rtl="0" eaLnBrk="1" latinLnBrk="0" hangingPunct="1">
         <a:lnSpc>
           <a:spcPct val="90000"/>
         </a:lnSpc>
         <a:spcBef>
-          <a:spcPts val="316"/>
+          <a:spcPts val="290"/>
         </a:spcBef>
         <a:buFont typeface="Arial" panose="020B0604020202020204" pitchFamily="34" charset="0"/>
         <a:buChar char="•"/>
-        <a:defRPr sz="1265" kern="1200">
+        <a:defRPr sz="1160" kern="1200">
           <a:solidFill>
             <a:schemeClr val="tx1"/>
           </a:solidFill>
@@ -3189,16 +3189,16 @@
           <a:cs typeface="+mn-cs"/>
         </a:defRPr>
       </a:lvl3pPr>
-      <a:lvl4pPr marL="1011966" indent="-144567" algn="l" defTabSz="578267" rtl="0" eaLnBrk="1" latinLnBrk="0" hangingPunct="1">
+      <a:lvl4pPr marL="927956" indent="-132565" algn="l" defTabSz="530261" rtl="0" eaLnBrk="1" latinLnBrk="0" hangingPunct="1">
         <a:lnSpc>
           <a:spcPct val="90000"/>
         </a:lnSpc>
         <a:spcBef>
-          <a:spcPts val="316"/>
+          <a:spcPts val="290"/>
         </a:spcBef>
         <a:buFont typeface="Arial" panose="020B0604020202020204" pitchFamily="34" charset="0"/>
         <a:buChar char="•"/>
-        <a:defRPr sz="1138" kern="1200">
+        <a:defRPr sz="1044" kern="1200">
           <a:solidFill>
             <a:schemeClr val="tx1"/>
           </a:solidFill>
@@ -3207,16 +3207,16 @@
           <a:cs typeface="+mn-cs"/>
         </a:defRPr>
       </a:lvl4pPr>
-      <a:lvl5pPr marL="1301100" indent="-144567" algn="l" defTabSz="578267" rtl="0" eaLnBrk="1" latinLnBrk="0" hangingPunct="1">
+      <a:lvl5pPr marL="1193086" indent="-132565" algn="l" defTabSz="530261" rtl="0" eaLnBrk="1" latinLnBrk="0" hangingPunct="1">
         <a:lnSpc>
           <a:spcPct val="90000"/>
         </a:lnSpc>
         <a:spcBef>
-          <a:spcPts val="316"/>
+          <a:spcPts val="290"/>
         </a:spcBef>
         <a:buFont typeface="Arial" panose="020B0604020202020204" pitchFamily="34" charset="0"/>
         <a:buChar char="•"/>
-        <a:defRPr sz="1138" kern="1200">
+        <a:defRPr sz="1044" kern="1200">
           <a:solidFill>
             <a:schemeClr val="tx1"/>
           </a:solidFill>
@@ -3225,16 +3225,16 @@
           <a:cs typeface="+mn-cs"/>
         </a:defRPr>
       </a:lvl5pPr>
-      <a:lvl6pPr marL="1590233" indent="-144567" algn="l" defTabSz="578267" rtl="0" eaLnBrk="1" latinLnBrk="0" hangingPunct="1">
+      <a:lvl6pPr marL="1458217" indent="-132565" algn="l" defTabSz="530261" rtl="0" eaLnBrk="1" latinLnBrk="0" hangingPunct="1">
         <a:lnSpc>
           <a:spcPct val="90000"/>
         </a:lnSpc>
         <a:spcBef>
-          <a:spcPts val="316"/>
+          <a:spcPts val="290"/>
         </a:spcBef>
         <a:buFont typeface="Arial" panose="020B0604020202020204" pitchFamily="34" charset="0"/>
         <a:buChar char="•"/>
-        <a:defRPr sz="1138" kern="1200">
+        <a:defRPr sz="1044" kern="1200">
           <a:solidFill>
             <a:schemeClr val="tx1"/>
           </a:solidFill>
@@ -3243,16 +3243,16 @@
           <a:cs typeface="+mn-cs"/>
         </a:defRPr>
       </a:lvl6pPr>
-      <a:lvl7pPr marL="1879366" indent="-144567" algn="l" defTabSz="578267" rtl="0" eaLnBrk="1" latinLnBrk="0" hangingPunct="1">
+      <a:lvl7pPr marL="1723347" indent="-132565" algn="l" defTabSz="530261" rtl="0" eaLnBrk="1" latinLnBrk="0" hangingPunct="1">
         <a:lnSpc>
           <a:spcPct val="90000"/>
         </a:lnSpc>
         <a:spcBef>
-          <a:spcPts val="316"/>
+          <a:spcPts val="290"/>
         </a:spcBef>
         <a:buFont typeface="Arial" panose="020B0604020202020204" pitchFamily="34" charset="0"/>
         <a:buChar char="•"/>
-        <a:defRPr sz="1138" kern="1200">
+        <a:defRPr sz="1044" kern="1200">
           <a:solidFill>
             <a:schemeClr val="tx1"/>
           </a:solidFill>
@@ -3261,16 +3261,16 @@
           <a:cs typeface="+mn-cs"/>
         </a:defRPr>
       </a:lvl7pPr>
-      <a:lvl8pPr marL="2168500" indent="-144567" algn="l" defTabSz="578267" rtl="0" eaLnBrk="1" latinLnBrk="0" hangingPunct="1">
+      <a:lvl8pPr marL="1988477" indent="-132565" algn="l" defTabSz="530261" rtl="0" eaLnBrk="1" latinLnBrk="0" hangingPunct="1">
         <a:lnSpc>
           <a:spcPct val="90000"/>
         </a:lnSpc>
         <a:spcBef>
-          <a:spcPts val="316"/>
+          <a:spcPts val="290"/>
         </a:spcBef>
         <a:buFont typeface="Arial" panose="020B0604020202020204" pitchFamily="34" charset="0"/>
         <a:buChar char="•"/>
-        <a:defRPr sz="1138" kern="1200">
+        <a:defRPr sz="1044" kern="1200">
           <a:solidFill>
             <a:schemeClr val="tx1"/>
           </a:solidFill>
@@ -3279,16 +3279,16 @@
           <a:cs typeface="+mn-cs"/>
         </a:defRPr>
       </a:lvl8pPr>
-      <a:lvl9pPr marL="2457633" indent="-144567" algn="l" defTabSz="578267" rtl="0" eaLnBrk="1" latinLnBrk="0" hangingPunct="1">
+      <a:lvl9pPr marL="2253607" indent="-132565" algn="l" defTabSz="530261" rtl="0" eaLnBrk="1" latinLnBrk="0" hangingPunct="1">
         <a:lnSpc>
           <a:spcPct val="90000"/>
         </a:lnSpc>
         <a:spcBef>
-          <a:spcPts val="316"/>
+          <a:spcPts val="290"/>
         </a:spcBef>
         <a:buFont typeface="Arial" panose="020B0604020202020204" pitchFamily="34" charset="0"/>
         <a:buChar char="•"/>
-        <a:defRPr sz="1138" kern="1200">
+        <a:defRPr sz="1044" kern="1200">
           <a:solidFill>
             <a:schemeClr val="tx1"/>
           </a:solidFill>
@@ -3302,8 +3302,8 @@
       <a:defPPr>
         <a:defRPr lang="en-US"/>
       </a:defPPr>
-      <a:lvl1pPr marL="0" algn="l" defTabSz="578267" rtl="0" eaLnBrk="1" latinLnBrk="0" hangingPunct="1">
-        <a:defRPr sz="1138" kern="1200">
+      <a:lvl1pPr marL="0" algn="l" defTabSz="530261" rtl="0" eaLnBrk="1" latinLnBrk="0" hangingPunct="1">
+        <a:defRPr sz="1044" kern="1200">
           <a:solidFill>
             <a:schemeClr val="tx1"/>
           </a:solidFill>
@@ -3312,8 +3312,8 @@
           <a:cs typeface="+mn-cs"/>
         </a:defRPr>
       </a:lvl1pPr>
-      <a:lvl2pPr marL="289133" algn="l" defTabSz="578267" rtl="0" eaLnBrk="1" latinLnBrk="0" hangingPunct="1">
-        <a:defRPr sz="1138" kern="1200">
+      <a:lvl2pPr marL="265130" algn="l" defTabSz="530261" rtl="0" eaLnBrk="1" latinLnBrk="0" hangingPunct="1">
+        <a:defRPr sz="1044" kern="1200">
           <a:solidFill>
             <a:schemeClr val="tx1"/>
           </a:solidFill>
@@ -3322,8 +3322,8 @@
           <a:cs typeface="+mn-cs"/>
         </a:defRPr>
       </a:lvl2pPr>
-      <a:lvl3pPr marL="578267" algn="l" defTabSz="578267" rtl="0" eaLnBrk="1" latinLnBrk="0" hangingPunct="1">
-        <a:defRPr sz="1138" kern="1200">
+      <a:lvl3pPr marL="530261" algn="l" defTabSz="530261" rtl="0" eaLnBrk="1" latinLnBrk="0" hangingPunct="1">
+        <a:defRPr sz="1044" kern="1200">
           <a:solidFill>
             <a:schemeClr val="tx1"/>
           </a:solidFill>
@@ -3332,8 +3332,8 @@
           <a:cs typeface="+mn-cs"/>
         </a:defRPr>
       </a:lvl3pPr>
-      <a:lvl4pPr marL="867400" algn="l" defTabSz="578267" rtl="0" eaLnBrk="1" latinLnBrk="0" hangingPunct="1">
-        <a:defRPr sz="1138" kern="1200">
+      <a:lvl4pPr marL="795391" algn="l" defTabSz="530261" rtl="0" eaLnBrk="1" latinLnBrk="0" hangingPunct="1">
+        <a:defRPr sz="1044" kern="1200">
           <a:solidFill>
             <a:schemeClr val="tx1"/>
           </a:solidFill>
@@ -3342,8 +3342,8 @@
           <a:cs typeface="+mn-cs"/>
         </a:defRPr>
       </a:lvl4pPr>
-      <a:lvl5pPr marL="1156533" algn="l" defTabSz="578267" rtl="0" eaLnBrk="1" latinLnBrk="0" hangingPunct="1">
-        <a:defRPr sz="1138" kern="1200">
+      <a:lvl5pPr marL="1060521" algn="l" defTabSz="530261" rtl="0" eaLnBrk="1" latinLnBrk="0" hangingPunct="1">
+        <a:defRPr sz="1044" kern="1200">
           <a:solidFill>
             <a:schemeClr val="tx1"/>
           </a:solidFill>
@@ -3352,8 +3352,8 @@
           <a:cs typeface="+mn-cs"/>
         </a:defRPr>
       </a:lvl5pPr>
-      <a:lvl6pPr marL="1445666" algn="l" defTabSz="578267" rtl="0" eaLnBrk="1" latinLnBrk="0" hangingPunct="1">
-        <a:defRPr sz="1138" kern="1200">
+      <a:lvl6pPr marL="1325651" algn="l" defTabSz="530261" rtl="0" eaLnBrk="1" latinLnBrk="0" hangingPunct="1">
+        <a:defRPr sz="1044" kern="1200">
           <a:solidFill>
             <a:schemeClr val="tx1"/>
           </a:solidFill>
@@ -3362,8 +3362,8 @@
           <a:cs typeface="+mn-cs"/>
         </a:defRPr>
       </a:lvl6pPr>
-      <a:lvl7pPr marL="1734800" algn="l" defTabSz="578267" rtl="0" eaLnBrk="1" latinLnBrk="0" hangingPunct="1">
-        <a:defRPr sz="1138" kern="1200">
+      <a:lvl7pPr marL="1590782" algn="l" defTabSz="530261" rtl="0" eaLnBrk="1" latinLnBrk="0" hangingPunct="1">
+        <a:defRPr sz="1044" kern="1200">
           <a:solidFill>
             <a:schemeClr val="tx1"/>
           </a:solidFill>
@@ -3372,8 +3372,8 @@
           <a:cs typeface="+mn-cs"/>
         </a:defRPr>
       </a:lvl7pPr>
-      <a:lvl8pPr marL="2023933" algn="l" defTabSz="578267" rtl="0" eaLnBrk="1" latinLnBrk="0" hangingPunct="1">
-        <a:defRPr sz="1138" kern="1200">
+      <a:lvl8pPr marL="1855912" algn="l" defTabSz="530261" rtl="0" eaLnBrk="1" latinLnBrk="0" hangingPunct="1">
+        <a:defRPr sz="1044" kern="1200">
           <a:solidFill>
             <a:schemeClr val="tx1"/>
           </a:solidFill>
@@ -3382,8 +3382,8 @@
           <a:cs typeface="+mn-cs"/>
         </a:defRPr>
       </a:lvl8pPr>
-      <a:lvl9pPr marL="2313066" algn="l" defTabSz="578267" rtl="0" eaLnBrk="1" latinLnBrk="0" hangingPunct="1">
-        <a:defRPr sz="1138" kern="1200">
+      <a:lvl9pPr marL="2121042" algn="l" defTabSz="530261" rtl="0" eaLnBrk="1" latinLnBrk="0" hangingPunct="1">
+        <a:defRPr sz="1044" kern="1200">
           <a:solidFill>
             <a:schemeClr val="tx1"/>
           </a:solidFill>
@@ -3428,8 +3428,8 @@
         </p:nvSpPr>
         <p:spPr>
           <a:xfrm>
-            <a:off x="410791" y="283293"/>
-            <a:ext cx="3410927" cy="3915600"/>
+            <a:off x="410794" y="543567"/>
+            <a:ext cx="3388416" cy="3281782"/>
           </a:xfrm>
           <a:prstGeom prst="rect">
             <a:avLst/>
@@ -3456,7 +3456,7 @@
           <a:lstStyle/>
           <a:p>
             <a:pPr algn="ctr"/>
-            <a:endParaRPr lang="zh-CN" altLang="en-US" b="1" dirty="0">
+            <a:endParaRPr lang="zh-CN" altLang="en-US" sz="1799" b="1" dirty="0">
               <a:latin typeface="Consolas" panose="020B0609020204030204" pitchFamily="49" charset="0"/>
             </a:endParaRPr>
           </a:p>
@@ -3478,8 +3478,8 @@
             </p:nvSpPr>
             <p:spPr>
               <a:xfrm>
-                <a:off x="573493" y="3344591"/>
-                <a:ext cx="728869" cy="410817"/>
+                <a:off x="573495" y="3164411"/>
+                <a:ext cx="728869" cy="410816"/>
               </a:xfrm>
               <a:prstGeom prst="rect">
                 <a:avLst/>
@@ -3521,14 +3521,14 @@
                       <m:sSub>
                         <m:sSubPr>
                           <m:ctrlPr>
-                            <a:rPr lang="en-US" altLang="zh-CN" i="1">
+                            <a:rPr lang="en-US" altLang="zh-CN" sz="1799" i="1">
                               <a:latin typeface="Cambria Math" panose="02040503050406030204" pitchFamily="18" charset="0"/>
                             </a:rPr>
                           </m:ctrlPr>
                         </m:sSubPr>
                         <m:e>
                           <m:r>
-                            <a:rPr lang="en-US" altLang="zh-CN" i="1">
+                            <a:rPr lang="en-US" altLang="zh-CN" sz="1799" i="1">
                               <a:latin typeface="Cambria Math" panose="02040503050406030204" pitchFamily="18" charset="0"/>
                             </a:rPr>
                             <m:t>𝑐</m:t>
@@ -3536,7 +3536,7 @@
                         </m:e>
                         <m:sub>
                           <m:r>
-                            <a:rPr lang="en-US" altLang="zh-CN" i="1">
+                            <a:rPr lang="en-US" altLang="zh-CN" sz="1799" i="1">
                               <a:latin typeface="Cambria Math" panose="02040503050406030204" pitchFamily="18" charset="0"/>
                             </a:rPr>
                             <m:t>1</m:t>
@@ -3546,7 +3546,7 @@
                     </m:oMath>
                   </m:oMathPara>
                 </a14:m>
-                <a:endParaRPr lang="zh-CN" altLang="en-US" dirty="0"/>
+                <a:endParaRPr lang="zh-CN" altLang="en-US" sz="1799" dirty="0"/>
               </a:p>
             </p:txBody>
           </p:sp>
@@ -3568,8 +3568,8 @@
             </p:nvSpPr>
             <p:spPr>
               <a:xfrm>
-                <a:off x="573493" y="3344591"/>
-                <a:ext cx="728869" cy="410817"/>
+                <a:off x="573495" y="3164411"/>
+                <a:ext cx="728869" cy="410816"/>
               </a:xfrm>
               <a:prstGeom prst="rect">
                 <a:avLst/>
@@ -3620,8 +3620,8 @@
             </p:nvSpPr>
             <p:spPr>
               <a:xfrm>
-                <a:off x="1302362" y="3344591"/>
-                <a:ext cx="728869" cy="410817"/>
+                <a:off x="1302363" y="3164411"/>
+                <a:ext cx="728869" cy="410816"/>
               </a:xfrm>
               <a:prstGeom prst="rect">
                 <a:avLst/>
@@ -3663,14 +3663,14 @@
                       <m:sSub>
                         <m:sSubPr>
                           <m:ctrlPr>
-                            <a:rPr lang="en-US" altLang="zh-CN" i="1">
+                            <a:rPr lang="en-US" altLang="zh-CN" sz="1799" i="1">
                               <a:latin typeface="Cambria Math" panose="02040503050406030204" pitchFamily="18" charset="0"/>
                             </a:rPr>
                           </m:ctrlPr>
                         </m:sSubPr>
                         <m:e>
                           <m:r>
-                            <a:rPr lang="en-US" altLang="zh-CN" i="1">
+                            <a:rPr lang="en-US" altLang="zh-CN" sz="1799" i="1">
                               <a:latin typeface="Cambria Math" panose="02040503050406030204" pitchFamily="18" charset="0"/>
                             </a:rPr>
                             <m:t>𝑐</m:t>
@@ -3678,7 +3678,7 @@
                         </m:e>
                         <m:sub>
                           <m:r>
-                            <a:rPr lang="en-US" altLang="zh-CN" i="1">
+                            <a:rPr lang="en-US" altLang="zh-CN" sz="1799" i="1">
                               <a:latin typeface="Cambria Math" panose="02040503050406030204" pitchFamily="18" charset="0"/>
                             </a:rPr>
                             <m:t>2</m:t>
@@ -3688,7 +3688,7 @@
                     </m:oMath>
                   </m:oMathPara>
                 </a14:m>
-                <a:endParaRPr lang="zh-CN" altLang="en-US" dirty="0"/>
+                <a:endParaRPr lang="zh-CN" altLang="en-US" sz="1799" dirty="0"/>
               </a:p>
             </p:txBody>
           </p:sp>
@@ -3710,8 +3710,8 @@
             </p:nvSpPr>
             <p:spPr>
               <a:xfrm>
-                <a:off x="1302362" y="3344591"/>
-                <a:ext cx="728869" cy="410817"/>
+                <a:off x="1302363" y="3164411"/>
+                <a:ext cx="728869" cy="410816"/>
               </a:xfrm>
               <a:prstGeom prst="rect">
                 <a:avLst/>
@@ -3762,8 +3762,8 @@
             </p:nvSpPr>
             <p:spPr>
               <a:xfrm>
-                <a:off x="2480304" y="3350963"/>
-                <a:ext cx="728869" cy="410817"/>
+                <a:off x="2480306" y="3170783"/>
+                <a:ext cx="728869" cy="410816"/>
               </a:xfrm>
               <a:prstGeom prst="rect">
                 <a:avLst/>
@@ -3805,14 +3805,14 @@
                       <m:sSub>
                         <m:sSubPr>
                           <m:ctrlPr>
-                            <a:rPr lang="en-US" altLang="zh-CN" i="1">
+                            <a:rPr lang="en-US" altLang="zh-CN" sz="1799" i="1">
                               <a:latin typeface="Cambria Math" panose="02040503050406030204" pitchFamily="18" charset="0"/>
                             </a:rPr>
                           </m:ctrlPr>
                         </m:sSubPr>
                         <m:e>
                           <m:r>
-                            <a:rPr lang="en-US" altLang="zh-CN" i="1">
+                            <a:rPr lang="en-US" altLang="zh-CN" sz="1799" i="1">
                               <a:latin typeface="Cambria Math" panose="02040503050406030204" pitchFamily="18" charset="0"/>
                             </a:rPr>
                             <m:t>𝑐</m:t>
@@ -3822,14 +3822,14 @@
                           <m:sSub>
                             <m:sSubPr>
                               <m:ctrlPr>
-                                <a:rPr lang="en-US" altLang="zh-CN" i="1">
+                                <a:rPr lang="en-US" altLang="zh-CN" sz="1799" i="1">
                                   <a:latin typeface="Cambria Math" panose="02040503050406030204" pitchFamily="18" charset="0"/>
                                 </a:rPr>
                               </m:ctrlPr>
                             </m:sSubPr>
                             <m:e>
                               <m:r>
-                                <a:rPr lang="en-US" altLang="zh-CN" i="1">
+                                <a:rPr lang="en-US" altLang="zh-CN" sz="1799" i="1">
                                   <a:latin typeface="Cambria Math" panose="02040503050406030204" pitchFamily="18" charset="0"/>
                                 </a:rPr>
                                 <m:t>𝑘</m:t>
@@ -3837,7 +3837,7 @@
                             </m:e>
                             <m:sub>
                               <m:r>
-                                <a:rPr lang="en-US" altLang="zh-CN" i="1">
+                                <a:rPr lang="en-US" altLang="zh-CN" sz="1799" i="1">
                                   <a:latin typeface="Cambria Math" panose="02040503050406030204" pitchFamily="18" charset="0"/>
                                 </a:rPr>
                                 <m:t>2</m:t>
@@ -3849,7 +3849,7 @@
                     </m:oMath>
                   </m:oMathPara>
                 </a14:m>
-                <a:endParaRPr lang="zh-CN" altLang="en-US" dirty="0"/>
+                <a:endParaRPr lang="zh-CN" altLang="en-US" sz="1799" dirty="0"/>
               </a:p>
             </p:txBody>
           </p:sp>
@@ -3871,8 +3871,8 @@
             </p:nvSpPr>
             <p:spPr>
               <a:xfrm>
-                <a:off x="2480304" y="3350963"/>
-                <a:ext cx="728869" cy="410817"/>
+                <a:off x="2480306" y="3170783"/>
+                <a:ext cx="728869" cy="410816"/>
               </a:xfrm>
               <a:prstGeom prst="rect">
                 <a:avLst/>
@@ -3923,7 +3923,7 @@
             </p:nvSpPr>
             <p:spPr>
               <a:xfrm>
-                <a:off x="973279" y="2996043"/>
+                <a:off x="973279" y="2815862"/>
                 <a:ext cx="2108334" cy="338554"/>
               </a:xfrm>
               <a:prstGeom prst="rect">
@@ -4002,7 +4002,7 @@
             </p:nvSpPr>
             <p:spPr>
               <a:xfrm>
-                <a:off x="973279" y="2996043"/>
+                <a:off x="973279" y="2815862"/>
                 <a:ext cx="2108334" cy="338554"/>
               </a:xfrm>
               <a:prstGeom prst="rect">
@@ -4011,7 +4011,7 @@
               <a:blipFill>
                 <a:blip r:embed="rId6"/>
                 <a:stretch>
-                  <a:fillRect l="-1734" t="-5357" r="-289" b="-21429"/>
+                  <a:fillRect l="-1734" t="-5455" r="-289" b="-23636"/>
                 </a:stretch>
               </a:blipFill>
             </p:spPr>
@@ -4046,8 +4046,8 @@
             </p:nvSpPr>
             <p:spPr>
               <a:xfrm>
-                <a:off x="548052" y="1499307"/>
-                <a:ext cx="728869" cy="410817"/>
+                <a:off x="548053" y="1319127"/>
+                <a:ext cx="728869" cy="410816"/>
               </a:xfrm>
               <a:prstGeom prst="rect">
                 <a:avLst/>
@@ -4089,14 +4089,14 @@
                       <m:sSub>
                         <m:sSubPr>
                           <m:ctrlPr>
-                            <a:rPr lang="en-US" altLang="zh-CN" i="1">
+                            <a:rPr lang="en-US" altLang="zh-CN" sz="1799" i="1">
                               <a:latin typeface="Cambria Math" panose="02040503050406030204" pitchFamily="18" charset="0"/>
                             </a:rPr>
                           </m:ctrlPr>
                         </m:sSubPr>
                         <m:e>
                           <m:r>
-                            <a:rPr lang="zh-CN" altLang="en-US" i="1">
+                            <a:rPr lang="zh-CN" altLang="en-US" sz="1799" i="1">
                               <a:latin typeface="Cambria Math" panose="02040503050406030204" pitchFamily="18" charset="0"/>
                             </a:rPr>
                             <m:t>𝒆</m:t>
@@ -4104,7 +4104,7 @@
                         </m:e>
                         <m:sub>
                           <m:r>
-                            <a:rPr lang="en-US" altLang="zh-CN" i="1">
+                            <a:rPr lang="en-US" altLang="zh-CN" sz="1799" i="1">
                               <a:latin typeface="Cambria Math" panose="02040503050406030204" pitchFamily="18" charset="0"/>
                             </a:rPr>
                             <m:t>1</m:t>
@@ -4114,7 +4114,7 @@
                     </m:oMath>
                   </m:oMathPara>
                 </a14:m>
-                <a:endParaRPr lang="zh-CN" altLang="en-US" dirty="0"/>
+                <a:endParaRPr lang="zh-CN" altLang="en-US" sz="1799" dirty="0"/>
               </a:p>
             </p:txBody>
           </p:sp>
@@ -4136,8 +4136,8 @@
             </p:nvSpPr>
             <p:spPr>
               <a:xfrm>
-                <a:off x="548052" y="1499307"/>
-                <a:ext cx="728869" cy="410817"/>
+                <a:off x="548053" y="1319127"/>
+                <a:ext cx="728869" cy="410816"/>
               </a:xfrm>
               <a:prstGeom prst="rect">
                 <a:avLst/>
@@ -4188,8 +4188,8 @@
             </p:nvSpPr>
             <p:spPr>
               <a:xfrm>
-                <a:off x="1276920" y="1499307"/>
-                <a:ext cx="728869" cy="410817"/>
+                <a:off x="1276921" y="1319127"/>
+                <a:ext cx="728869" cy="410816"/>
               </a:xfrm>
               <a:prstGeom prst="rect">
                 <a:avLst/>
@@ -4231,14 +4231,14 @@
                       <m:sSub>
                         <m:sSubPr>
                           <m:ctrlPr>
-                            <a:rPr lang="en-US" altLang="zh-CN" i="1">
+                            <a:rPr lang="en-US" altLang="zh-CN" sz="1799" i="1">
                               <a:latin typeface="Cambria Math" panose="02040503050406030204" pitchFamily="18" charset="0"/>
                             </a:rPr>
                           </m:ctrlPr>
                         </m:sSubPr>
                         <m:e>
                           <m:r>
-                            <a:rPr lang="zh-CN" altLang="en-US" i="1">
+                            <a:rPr lang="zh-CN" altLang="en-US" sz="1799" i="1">
                               <a:latin typeface="Cambria Math" panose="02040503050406030204" pitchFamily="18" charset="0"/>
                             </a:rPr>
                             <m:t>𝒆</m:t>
@@ -4246,7 +4246,7 @@
                         </m:e>
                         <m:sub>
                           <m:r>
-                            <a:rPr lang="en-US" altLang="zh-CN" i="1">
+                            <a:rPr lang="en-US" altLang="zh-CN" sz="1799" i="1">
                               <a:latin typeface="Cambria Math" panose="02040503050406030204" pitchFamily="18" charset="0"/>
                             </a:rPr>
                             <m:t>2</m:t>
@@ -4256,7 +4256,7 @@
                     </m:oMath>
                   </m:oMathPara>
                 </a14:m>
-                <a:endParaRPr lang="zh-CN" altLang="en-US" dirty="0"/>
+                <a:endParaRPr lang="zh-CN" altLang="en-US" sz="1799" dirty="0"/>
               </a:p>
             </p:txBody>
           </p:sp>
@@ -4278,8 +4278,8 @@
             </p:nvSpPr>
             <p:spPr>
               <a:xfrm>
-                <a:off x="1276920" y="1499307"/>
-                <a:ext cx="728869" cy="410817"/>
+                <a:off x="1276921" y="1319127"/>
+                <a:ext cx="728869" cy="410816"/>
               </a:xfrm>
               <a:prstGeom prst="rect">
                 <a:avLst/>
@@ -4330,8 +4330,8 @@
             </p:nvSpPr>
             <p:spPr>
               <a:xfrm>
-                <a:off x="2623390" y="1493383"/>
-                <a:ext cx="728869" cy="410817"/>
+                <a:off x="2623391" y="1313203"/>
+                <a:ext cx="728869" cy="410816"/>
               </a:xfrm>
               <a:prstGeom prst="rect">
                 <a:avLst/>
@@ -4373,14 +4373,14 @@
                       <m:sSub>
                         <m:sSubPr>
                           <m:ctrlPr>
-                            <a:rPr lang="en-US" altLang="zh-CN" i="1">
+                            <a:rPr lang="en-US" altLang="zh-CN" sz="1799" i="1">
                               <a:latin typeface="Cambria Math" panose="02040503050406030204" pitchFamily="18" charset="0"/>
                             </a:rPr>
                           </m:ctrlPr>
                         </m:sSubPr>
                         <m:e>
                           <m:r>
-                            <a:rPr lang="zh-CN" altLang="en-US" i="1">
+                            <a:rPr lang="zh-CN" altLang="en-US" sz="1799" i="1">
                               <a:latin typeface="Cambria Math" panose="02040503050406030204" pitchFamily="18" charset="0"/>
                             </a:rPr>
                             <m:t>𝒆</m:t>
@@ -4390,14 +4390,14 @@
                           <m:sSub>
                             <m:sSubPr>
                               <m:ctrlPr>
-                                <a:rPr lang="en-US" altLang="zh-CN" i="1">
+                                <a:rPr lang="en-US" altLang="zh-CN" sz="1799" i="1">
                                   <a:latin typeface="Cambria Math" panose="02040503050406030204" pitchFamily="18" charset="0"/>
                                 </a:rPr>
                               </m:ctrlPr>
                             </m:sSubPr>
                             <m:e>
                               <m:r>
-                                <a:rPr lang="en-US" altLang="zh-CN" i="1">
+                                <a:rPr lang="en-US" altLang="zh-CN" sz="1799" i="1">
                                   <a:latin typeface="Cambria Math" panose="02040503050406030204" pitchFamily="18" charset="0"/>
                                 </a:rPr>
                                 <m:t>𝑘</m:t>
@@ -4405,7 +4405,7 @@
                             </m:e>
                             <m:sub>
                               <m:r>
-                                <a:rPr lang="en-US" altLang="zh-CN" i="1">
+                                <a:rPr lang="en-US" altLang="zh-CN" sz="1799" i="1">
                                   <a:latin typeface="Cambria Math" panose="02040503050406030204" pitchFamily="18" charset="0"/>
                                 </a:rPr>
                                 <m:t>1</m:t>
@@ -4417,7 +4417,7 @@
                     </m:oMath>
                   </m:oMathPara>
                 </a14:m>
-                <a:endParaRPr lang="zh-CN" altLang="en-US" dirty="0"/>
+                <a:endParaRPr lang="zh-CN" altLang="en-US" sz="1799" dirty="0"/>
               </a:p>
             </p:txBody>
           </p:sp>
@@ -4439,8 +4439,8 @@
             </p:nvSpPr>
             <p:spPr>
               <a:xfrm>
-                <a:off x="2623390" y="1493383"/>
-                <a:ext cx="728869" cy="410817"/>
+                <a:off x="2623391" y="1313203"/>
+                <a:ext cx="728869" cy="410816"/>
               </a:xfrm>
               <a:prstGeom prst="rect">
                 <a:avLst/>
@@ -4489,7 +4489,7 @@
         </p:nvSpPr>
         <p:spPr>
           <a:xfrm>
-            <a:off x="728735" y="1178520"/>
+            <a:off x="728737" y="998339"/>
             <a:ext cx="2813463" cy="338554"/>
           </a:xfrm>
           <a:prstGeom prst="rect">
@@ -4511,8 +4511,8 @@
           </a:p>
         </p:txBody>
       </p:sp>
-      <mc:AlternateContent xmlns:mc="http://schemas.openxmlformats.org/markup-compatibility/2006" xmlns:a14="http://schemas.microsoft.com/office/drawing/2010/main">
-        <mc:Choice Requires="a14">
+      <mc:AlternateContent xmlns:mc="http://schemas.openxmlformats.org/markup-compatibility/2006">
+        <mc:Choice xmlns:a14="http://schemas.microsoft.com/office/drawing/2010/main" Requires="a14">
           <p:sp>
             <p:nvSpPr>
               <p:cNvPr id="12" name="矩形 11">
@@ -4527,8 +4527,8 @@
             </p:nvSpPr>
             <p:spPr>
               <a:xfrm>
-                <a:off x="506740" y="2394983"/>
-                <a:ext cx="1137786" cy="410817"/>
+                <a:off x="506740" y="2214802"/>
+                <a:ext cx="1137786" cy="410816"/>
               </a:xfrm>
               <a:prstGeom prst="rect">
                 <a:avLst/>
@@ -4570,14 +4570,14 @@
                       <m:sSub>
                         <m:sSubPr>
                           <m:ctrlPr>
-                            <a:rPr lang="en-US" altLang="zh-CN" i="1">
+                            <a:rPr lang="en-US" altLang="zh-CN" sz="1799" i="1">
                               <a:latin typeface="Cambria Math" panose="02040503050406030204" pitchFamily="18" charset="0"/>
                             </a:rPr>
                           </m:ctrlPr>
                         </m:sSubPr>
                         <m:e>
                           <m:r>
-                            <a:rPr lang="zh-CN" altLang="en-US" i="1">
+                            <a:rPr lang="zh-CN" altLang="en-US" sz="1799" i="1">
                               <a:latin typeface="Cambria Math" panose="02040503050406030204" pitchFamily="18" charset="0"/>
                             </a:rPr>
                             <m:t>𝒆</m:t>
@@ -4585,7 +4585,7 @@
                         </m:e>
                         <m:sub>
                           <m:r>
-                            <a:rPr lang="en-US" altLang="zh-CN" i="1">
+                            <a:rPr lang="en-US" altLang="zh-CN" sz="1799" i="1">
                               <a:latin typeface="Cambria Math" panose="02040503050406030204" pitchFamily="18" charset="0"/>
                             </a:rPr>
                             <m:t>2</m:t>
@@ -4593,7 +4593,7 @@
                         </m:sub>
                       </m:sSub>
                       <m:r>
-                        <a:rPr lang="en-US" altLang="zh-CN" i="1">
+                        <a:rPr lang="en-US" altLang="zh-CN" sz="1799" i="1">
                           <a:latin typeface="Cambria Math" panose="02040503050406030204" pitchFamily="18" charset="0"/>
                         </a:rPr>
                         <m:t>−</m:t>
@@ -4601,14 +4601,14 @@
                       <m:sSub>
                         <m:sSubPr>
                           <m:ctrlPr>
-                            <a:rPr lang="en-US" altLang="zh-CN" i="1">
+                            <a:rPr lang="en-US" altLang="zh-CN" sz="1799" i="1">
                               <a:latin typeface="Cambria Math" panose="02040503050406030204" pitchFamily="18" charset="0"/>
                             </a:rPr>
                           </m:ctrlPr>
                         </m:sSubPr>
                         <m:e>
                           <m:r>
-                            <a:rPr lang="zh-CN" altLang="en-US" i="1">
+                            <a:rPr lang="zh-CN" altLang="en-US" sz="1799" i="1">
                               <a:latin typeface="Cambria Math" panose="02040503050406030204" pitchFamily="18" charset="0"/>
                             </a:rPr>
                             <m:t>𝒆</m:t>
@@ -4616,7 +4616,7 @@
                         </m:e>
                         <m:sub>
                           <m:r>
-                            <a:rPr lang="en-US" altLang="zh-CN" i="1">
+                            <a:rPr lang="en-US" altLang="zh-CN" sz="1799" i="1">
                               <a:latin typeface="Cambria Math" panose="02040503050406030204" pitchFamily="18" charset="0"/>
                             </a:rPr>
                             <m:t>1</m:t>
@@ -4626,12 +4626,12 @@
                     </m:oMath>
                   </m:oMathPara>
                 </a14:m>
-                <a:endParaRPr lang="zh-CN" altLang="en-US" dirty="0"/>
+                <a:endParaRPr lang="zh-CN" altLang="en-US" sz="1799" dirty="0"/>
               </a:p>
             </p:txBody>
           </p:sp>
         </mc:Choice>
-        <mc:Fallback xmlns="">
+        <mc:Fallback>
           <p:sp>
             <p:nvSpPr>
               <p:cNvPr id="12" name="矩形 11">
@@ -4648,8 +4648,8 @@
             </p:nvSpPr>
             <p:spPr>
               <a:xfrm>
-                <a:off x="506740" y="2394983"/>
-                <a:ext cx="1137786" cy="410817"/>
+                <a:off x="506740" y="2214802"/>
+                <a:ext cx="1137786" cy="410816"/>
               </a:xfrm>
               <a:prstGeom prst="rect">
                 <a:avLst/>
@@ -4698,7 +4698,7 @@
         </p:nvSpPr>
         <p:spPr>
           <a:xfrm>
-            <a:off x="586531" y="2043737"/>
+            <a:off x="586531" y="1863557"/>
             <a:ext cx="3028778" cy="338554"/>
           </a:xfrm>
           <a:prstGeom prst="rect">
@@ -4720,8 +4720,8 @@
           </a:p>
         </p:txBody>
       </p:sp>
-      <mc:AlternateContent xmlns:mc="http://schemas.openxmlformats.org/markup-compatibility/2006" xmlns:a14="http://schemas.microsoft.com/office/drawing/2010/main">
-        <mc:Choice Requires="a14">
+      <mc:AlternateContent xmlns:mc="http://schemas.openxmlformats.org/markup-compatibility/2006">
+        <mc:Choice xmlns:a14="http://schemas.microsoft.com/office/drawing/2010/main" Requires="a14">
           <p:sp>
             <p:nvSpPr>
               <p:cNvPr id="16" name="矩形 15">
@@ -4736,8 +4736,8 @@
             </p:nvSpPr>
             <p:spPr>
               <a:xfrm>
-                <a:off x="2018460" y="2408369"/>
-                <a:ext cx="1463862" cy="410817"/>
+                <a:off x="2018461" y="2228189"/>
+                <a:ext cx="1463862" cy="410816"/>
               </a:xfrm>
               <a:prstGeom prst="rect">
                 <a:avLst/>
@@ -4779,14 +4779,14 @@
                       <m:sSub>
                         <m:sSubPr>
                           <m:ctrlPr>
-                            <a:rPr lang="en-US" altLang="zh-CN" i="1">
+                            <a:rPr lang="en-US" altLang="zh-CN" sz="1799" i="1">
                               <a:latin typeface="Cambria Math" panose="02040503050406030204" pitchFamily="18" charset="0"/>
                             </a:rPr>
                           </m:ctrlPr>
                         </m:sSubPr>
                         <m:e>
                           <m:r>
-                            <a:rPr lang="zh-CN" altLang="en-US" i="1">
+                            <a:rPr lang="zh-CN" altLang="en-US" sz="1799" i="1">
                               <a:latin typeface="Cambria Math" panose="02040503050406030204" pitchFamily="18" charset="0"/>
                             </a:rPr>
                             <m:t>𝒆</m:t>
@@ -4796,14 +4796,14 @@
                           <m:sSub>
                             <m:sSubPr>
                               <m:ctrlPr>
-                                <a:rPr lang="en-US" altLang="zh-CN" i="1">
+                                <a:rPr lang="en-US" altLang="zh-CN" sz="1799" i="1">
                                   <a:latin typeface="Cambria Math" panose="02040503050406030204" pitchFamily="18" charset="0"/>
                                 </a:rPr>
                               </m:ctrlPr>
                             </m:sSubPr>
                             <m:e>
                               <m:r>
-                                <a:rPr lang="en-US" altLang="zh-CN" i="1">
+                                <a:rPr lang="en-US" altLang="zh-CN" sz="1799" i="1">
                                   <a:latin typeface="Cambria Math" panose="02040503050406030204" pitchFamily="18" charset="0"/>
                                 </a:rPr>
                                 <m:t>𝑘</m:t>
@@ -4811,7 +4811,7 @@
                             </m:e>
                             <m:sub>
                               <m:r>
-                                <a:rPr lang="en-US" altLang="zh-CN" i="1">
+                                <a:rPr lang="en-US" altLang="zh-CN" sz="1799" i="1">
                                   <a:latin typeface="Cambria Math" panose="02040503050406030204" pitchFamily="18" charset="0"/>
                                 </a:rPr>
                                 <m:t>1</m:t>
@@ -4821,7 +4821,7 @@
                         </m:sub>
                       </m:sSub>
                       <m:r>
-                        <a:rPr lang="en-US" altLang="zh-CN" i="1">
+                        <a:rPr lang="en-US" altLang="zh-CN" sz="1799" i="1">
                           <a:latin typeface="Cambria Math" panose="02040503050406030204" pitchFamily="18" charset="0"/>
                         </a:rPr>
                         <m:t>−</m:t>
@@ -4829,14 +4829,14 @@
                       <m:sSub>
                         <m:sSubPr>
                           <m:ctrlPr>
-                            <a:rPr lang="en-US" altLang="zh-CN" i="1">
+                            <a:rPr lang="en-US" altLang="zh-CN" sz="1799" i="1">
                               <a:latin typeface="Cambria Math" panose="02040503050406030204" pitchFamily="18" charset="0"/>
                             </a:rPr>
                           </m:ctrlPr>
                         </m:sSubPr>
                         <m:e>
                           <m:r>
-                            <a:rPr lang="zh-CN" altLang="en-US" i="1">
+                            <a:rPr lang="zh-CN" altLang="en-US" sz="1799" i="1">
                               <a:latin typeface="Cambria Math" panose="02040503050406030204" pitchFamily="18" charset="0"/>
                             </a:rPr>
                             <m:t>𝒆</m:t>
@@ -4846,14 +4846,14 @@
                           <m:sSub>
                             <m:sSubPr>
                               <m:ctrlPr>
-                                <a:rPr lang="en-US" altLang="zh-CN" i="1">
+                                <a:rPr lang="en-US" altLang="zh-CN" sz="1799" i="1">
                                   <a:latin typeface="Cambria Math" panose="02040503050406030204" pitchFamily="18" charset="0"/>
                                 </a:rPr>
                               </m:ctrlPr>
                             </m:sSubPr>
                             <m:e>
                               <m:r>
-                                <a:rPr lang="en-US" altLang="zh-CN" i="1">
+                                <a:rPr lang="en-US" altLang="zh-CN" sz="1799" i="1">
                                   <a:latin typeface="Cambria Math" panose="02040503050406030204" pitchFamily="18" charset="0"/>
                                 </a:rPr>
                                 <m:t>𝑘</m:t>
@@ -4861,7 +4861,7 @@
                             </m:e>
                             <m:sub>
                               <m:r>
-                                <a:rPr lang="en-US" altLang="zh-CN" i="1">
+                                <a:rPr lang="en-US" altLang="zh-CN" sz="1799" i="1">
                                   <a:latin typeface="Cambria Math" panose="02040503050406030204" pitchFamily="18" charset="0"/>
                                 </a:rPr>
                                 <m:t>1</m:t>
@@ -4869,7 +4869,7 @@
                             </m:sub>
                           </m:sSub>
                           <m:r>
-                            <a:rPr lang="en-US" altLang="zh-CN" i="1">
+                            <a:rPr lang="en-US" altLang="zh-CN" sz="1799" i="1">
                               <a:latin typeface="Cambria Math" panose="02040503050406030204" pitchFamily="18" charset="0"/>
                             </a:rPr>
                             <m:t>−1</m:t>
@@ -4879,12 +4879,12 @@
                     </m:oMath>
                   </m:oMathPara>
                 </a14:m>
-                <a:endParaRPr lang="zh-CN" altLang="en-US" dirty="0"/>
+                <a:endParaRPr lang="zh-CN" altLang="en-US" sz="1799" dirty="0"/>
               </a:p>
             </p:txBody>
           </p:sp>
         </mc:Choice>
-        <mc:Fallback xmlns="">
+        <mc:Fallback>
           <p:sp>
             <p:nvSpPr>
               <p:cNvPr id="16" name="矩形 15">
@@ -4901,8 +4901,8 @@
             </p:nvSpPr>
             <p:spPr>
               <a:xfrm>
-                <a:off x="2018460" y="2408369"/>
-                <a:ext cx="1463862" cy="410817"/>
+                <a:off x="2018461" y="2228189"/>
+                <a:ext cx="1463862" cy="410816"/>
               </a:xfrm>
               <a:prstGeom prst="rect">
                 <a:avLst/>
@@ -4937,8 +4937,8 @@
           </p:sp>
         </mc:Fallback>
       </mc:AlternateContent>
-      <mc:AlternateContent xmlns:mc="http://schemas.openxmlformats.org/markup-compatibility/2006" xmlns:a14="http://schemas.microsoft.com/office/drawing/2010/main">
-        <mc:Choice Requires="a14">
+      <mc:AlternateContent xmlns:mc="http://schemas.openxmlformats.org/markup-compatibility/2006">
+        <mc:Choice xmlns:a14="http://schemas.microsoft.com/office/drawing/2010/main" Requires="a14">
           <p:sp>
             <p:nvSpPr>
               <p:cNvPr id="17" name="矩形 16">
@@ -4953,8 +4953,8 @@
             </p:nvSpPr>
             <p:spPr>
               <a:xfrm>
-                <a:off x="4200407" y="723747"/>
-                <a:ext cx="4941127" cy="3561284"/>
+                <a:off x="4200409" y="543567"/>
+                <a:ext cx="5007838" cy="3315633"/>
               </a:xfrm>
               <a:prstGeom prst="rect">
                 <a:avLst/>
@@ -4987,7 +4987,7 @@
                     </m:oMathParaPr>
                     <m:oMath xmlns:m="http://schemas.openxmlformats.org/officeDocument/2006/math">
                       <a:fld id="{825F15A7-03F4-43D7-82C5-3E23DA2F108C}" type="mathplaceholder">
-                        <a:rPr lang="zh-CN" altLang="en-US" i="1">
+                        <a:rPr lang="zh-CN" altLang="en-US" sz="1799" i="1">
                           <a:latin typeface="Cambria Math" panose="02040503050406030204" pitchFamily="18" charset="0"/>
                         </a:rPr>
                         <a:t>在此处键入公式。</a:t>
@@ -4995,12 +4995,12 @@
                     </m:oMath>
                   </m:oMathPara>
                 </a14:m>
-                <a:endParaRPr lang="zh-CN" altLang="en-US" dirty="0"/>
+                <a:endParaRPr lang="zh-CN" altLang="en-US" sz="1799" dirty="0"/>
               </a:p>
             </p:txBody>
           </p:sp>
         </mc:Choice>
-        <mc:Fallback xmlns="">
+        <mc:Fallback>
           <p:sp>
             <p:nvSpPr>
               <p:cNvPr id="17" name="矩形 16">
@@ -5017,8 +5017,8 @@
             </p:nvSpPr>
             <p:spPr>
               <a:xfrm>
-                <a:off x="4200407" y="723747"/>
-                <a:ext cx="4941127" cy="3561284"/>
+                <a:off x="4200409" y="543567"/>
+                <a:ext cx="5007838" cy="3315633"/>
               </a:xfrm>
               <a:prstGeom prst="rect">
                 <a:avLst/>
@@ -5060,8 +5060,8 @@
         </p:nvSpPr>
         <p:spPr>
           <a:xfrm>
-            <a:off x="4332575" y="723746"/>
-            <a:ext cx="1838383" cy="351956"/>
+            <a:off x="4332577" y="543565"/>
+            <a:ext cx="1838383" cy="307777"/>
           </a:xfrm>
           <a:prstGeom prst="rect">
             <a:avLst/>
@@ -5075,10 +5075,10 @@
           <a:lstStyle/>
           <a:p>
             <a:r>
-              <a:rPr lang="en-US" altLang="zh-CN" b="1" dirty="0"/>
+              <a:rPr lang="en-US" altLang="zh-CN" sz="1400" b="1" dirty="0"/>
               <a:t>RL framework</a:t>
             </a:r>
-            <a:endParaRPr lang="zh-CN" altLang="en-US" b="1" dirty="0"/>
+            <a:endParaRPr lang="zh-CN" altLang="en-US" sz="1400" b="1" dirty="0"/>
           </a:p>
         </p:txBody>
       </p:sp>
@@ -5096,7 +5096,7 @@
         </p:nvSpPr>
         <p:spPr>
           <a:xfrm>
-            <a:off x="4881497" y="1065518"/>
+            <a:off x="4881497" y="885338"/>
             <a:ext cx="4124490" cy="2191632"/>
           </a:xfrm>
           <a:prstGeom prst="rect">
@@ -5164,8 +5164,8 @@
         </p:nvSpPr>
         <p:spPr>
           <a:xfrm>
-            <a:off x="7513041" y="3406181"/>
-            <a:ext cx="1372047" cy="770760"/>
+            <a:off x="7585552" y="3255503"/>
+            <a:ext cx="1270956" cy="569845"/>
           </a:xfrm>
           <a:prstGeom prst="flowChartMagneticDisk">
             <a:avLst/>
@@ -5218,8 +5218,8 @@
         </p:nvSpPr>
         <p:spPr>
           <a:xfrm>
-            <a:off x="9752120" y="1594337"/>
-            <a:ext cx="1815546" cy="1004286"/>
+            <a:off x="9752120" y="1414157"/>
+            <a:ext cx="1815547" cy="1004286"/>
           </a:xfrm>
           <a:prstGeom prst="flowChartDecision">
             <a:avLst/>
@@ -5266,8 +5266,8 @@
         </p:nvSpPr>
         <p:spPr>
           <a:xfrm>
-            <a:off x="4927782" y="3453168"/>
-            <a:ext cx="1398147" cy="654505"/>
+            <a:off x="4856160" y="3324381"/>
+            <a:ext cx="1323598" cy="464869"/>
           </a:xfrm>
           <a:prstGeom prst="rect">
             <a:avLst/>
@@ -5344,8 +5344,8 @@
         </p:nvCxnSpPr>
         <p:spPr>
           <a:xfrm>
-            <a:off x="6397429" y="3779465"/>
-            <a:ext cx="1150837" cy="0"/>
+            <a:off x="6251585" y="3491837"/>
+            <a:ext cx="1303856" cy="0"/>
           </a:xfrm>
           <a:prstGeom prst="straightConnector1">
             <a:avLst/>
@@ -5390,8 +5390,8 @@
         </p:nvCxnSpPr>
         <p:spPr>
           <a:xfrm flipH="1">
-            <a:off x="6362205" y="3922045"/>
-            <a:ext cx="1154923" cy="0"/>
+            <a:off x="6225911" y="3634417"/>
+            <a:ext cx="1298393" cy="0"/>
           </a:xfrm>
           <a:prstGeom prst="straightConnector1">
             <a:avLst/>
@@ -5435,7 +5435,7 @@
         </p:nvSpPr>
         <p:spPr>
           <a:xfrm>
-            <a:off x="6617776" y="3532579"/>
+            <a:off x="6624949" y="3244953"/>
             <a:ext cx="632906" cy="277127"/>
           </a:xfrm>
           <a:prstGeom prst="rect">
@@ -5455,7 +5455,7 @@
               </a:rPr>
               <a:t>write</a:t>
             </a:r>
-            <a:endParaRPr lang="zh-CN" altLang="en-US" b="1" dirty="0">
+            <a:endParaRPr lang="zh-CN" altLang="en-US" sz="1799" b="1" dirty="0">
               <a:latin typeface="Consolas" panose="020B0609020204030204" pitchFamily="49" charset="0"/>
             </a:endParaRPr>
           </a:p>
@@ -5475,7 +5475,7 @@
         </p:nvSpPr>
         <p:spPr>
           <a:xfrm>
-            <a:off x="6630071" y="3918038"/>
+            <a:off x="6637244" y="3630411"/>
             <a:ext cx="632906" cy="277127"/>
           </a:xfrm>
           <a:prstGeom prst="rect">
@@ -5495,7 +5495,7 @@
               </a:rPr>
               <a:t>read</a:t>
             </a:r>
-            <a:endParaRPr lang="zh-CN" altLang="en-US" b="1" dirty="0">
+            <a:endParaRPr lang="zh-CN" altLang="en-US" sz="1799" b="1" dirty="0">
               <a:latin typeface="Consolas" panose="020B0609020204030204" pitchFamily="49" charset="0"/>
             </a:endParaRPr>
           </a:p>
@@ -5517,7 +5517,7 @@
         </p:nvCxnSpPr>
         <p:spPr>
           <a:xfrm flipV="1">
-            <a:off x="5648853" y="3004447"/>
+            <a:off x="5517959" y="2912773"/>
             <a:ext cx="0" cy="411608"/>
           </a:xfrm>
           <a:prstGeom prst="straightConnector1">
@@ -5559,8 +5559,8 @@
         </p:nvSpPr>
         <p:spPr>
           <a:xfrm>
-            <a:off x="4272352" y="3698903"/>
-            <a:ext cx="689108" cy="277127"/>
+            <a:off x="5084507" y="3089724"/>
+            <a:ext cx="689107" cy="230832"/>
           </a:xfrm>
           <a:prstGeom prst="rect">
             <a:avLst/>
@@ -5574,12 +5574,12 @@
           <a:lstStyle/>
           <a:p>
             <a:r>
-              <a:rPr lang="en-US" altLang="zh-CN" sz="1201" b="1" dirty="0">
+              <a:rPr lang="en-US" altLang="zh-CN" sz="900" b="1" dirty="0">
                 <a:latin typeface="Consolas" panose="020B0609020204030204" pitchFamily="49" charset="0"/>
               </a:rPr>
               <a:t>train</a:t>
             </a:r>
-            <a:endParaRPr lang="zh-CN" altLang="en-US" sz="1201" b="1" dirty="0">
+            <a:endParaRPr lang="zh-CN" altLang="en-US" sz="1100" b="1" dirty="0">
               <a:latin typeface="Consolas" panose="020B0609020204030204" pitchFamily="49" charset="0"/>
             </a:endParaRPr>
           </a:p>
@@ -5602,7 +5602,7 @@
         </p:nvCxnSpPr>
         <p:spPr>
           <a:xfrm flipV="1">
-            <a:off x="4387753" y="1351185"/>
+            <a:off x="4387755" y="1171004"/>
             <a:ext cx="837247" cy="905374"/>
           </a:xfrm>
           <a:prstGeom prst="straightConnector1">
@@ -5644,7 +5644,7 @@
         </p:nvSpPr>
         <p:spPr>
           <a:xfrm>
-            <a:off x="5224996" y="1171539"/>
+            <a:off x="5224996" y="991360"/>
             <a:ext cx="393994" cy="359297"/>
           </a:xfrm>
           <a:prstGeom prst="ellipse">
@@ -5689,7 +5689,7 @@
         </p:nvSpPr>
         <p:spPr>
           <a:xfrm>
-            <a:off x="5224996" y="1627039"/>
+            <a:off x="5224996" y="1446860"/>
             <a:ext cx="393994" cy="359297"/>
           </a:xfrm>
           <a:prstGeom prst="ellipse">
@@ -5734,7 +5734,7 @@
         </p:nvSpPr>
         <p:spPr>
           <a:xfrm>
-            <a:off x="5224996" y="2111824"/>
+            <a:off x="5224996" y="1931645"/>
             <a:ext cx="393994" cy="359297"/>
           </a:xfrm>
           <a:prstGeom prst="ellipse">
@@ -5779,7 +5779,7 @@
         </p:nvSpPr>
         <p:spPr>
           <a:xfrm>
-            <a:off x="5232063" y="2636746"/>
+            <a:off x="5232064" y="2456567"/>
             <a:ext cx="393994" cy="359297"/>
           </a:xfrm>
           <a:prstGeom prst="ellipse">
@@ -5827,7 +5827,7 @@
         </p:nvCxnSpPr>
         <p:spPr>
           <a:xfrm flipV="1">
-            <a:off x="4406587" y="1806683"/>
+            <a:off x="4406588" y="1626502"/>
             <a:ext cx="818413" cy="476446"/>
           </a:xfrm>
           <a:prstGeom prst="straightConnector1">
@@ -5872,7 +5872,7 @@
         </p:nvCxnSpPr>
         <p:spPr>
           <a:xfrm flipV="1">
-            <a:off x="4387232" y="2291469"/>
+            <a:off x="4387234" y="2111288"/>
             <a:ext cx="837769" cy="6804"/>
           </a:xfrm>
           <a:prstGeom prst="straightConnector1">
@@ -5917,7 +5917,7 @@
         </p:nvCxnSpPr>
         <p:spPr>
           <a:xfrm>
-            <a:off x="4381833" y="2267048"/>
+            <a:off x="4381834" y="2086867"/>
             <a:ext cx="850230" cy="549342"/>
           </a:xfrm>
           <a:prstGeom prst="straightConnector1">
@@ -5959,7 +5959,7 @@
         </p:nvSpPr>
         <p:spPr>
           <a:xfrm>
-            <a:off x="6225018" y="1179946"/>
+            <a:off x="6225019" y="999767"/>
             <a:ext cx="393994" cy="359297"/>
           </a:xfrm>
           <a:prstGeom prst="ellipse">
@@ -6004,7 +6004,7 @@
         </p:nvSpPr>
         <p:spPr>
           <a:xfrm>
-            <a:off x="6225018" y="1635446"/>
+            <a:off x="6225019" y="1455267"/>
             <a:ext cx="393994" cy="359297"/>
           </a:xfrm>
           <a:prstGeom prst="ellipse">
@@ -6049,7 +6049,7 @@
         </p:nvSpPr>
         <p:spPr>
           <a:xfrm>
-            <a:off x="6225018" y="2120231"/>
+            <a:off x="6225019" y="1940052"/>
             <a:ext cx="393994" cy="359297"/>
           </a:xfrm>
           <a:prstGeom prst="ellipse">
@@ -6094,7 +6094,7 @@
         </p:nvSpPr>
         <p:spPr>
           <a:xfrm>
-            <a:off x="6232085" y="2645153"/>
+            <a:off x="6232086" y="2464974"/>
             <a:ext cx="393994" cy="359297"/>
           </a:xfrm>
           <a:prstGeom prst="ellipse">
@@ -6143,8 +6143,8 @@
         </p:nvCxnSpPr>
         <p:spPr>
           <a:xfrm>
-            <a:off x="5618991" y="1351187"/>
-            <a:ext cx="606028" cy="8407"/>
+            <a:off x="5618991" y="1171007"/>
+            <a:ext cx="606028" cy="8406"/>
           </a:xfrm>
           <a:prstGeom prst="line">
             <a:avLst/>
@@ -6182,8 +6182,8 @@
         </p:nvCxnSpPr>
         <p:spPr>
           <a:xfrm>
-            <a:off x="5638384" y="1847003"/>
-            <a:ext cx="606028" cy="8407"/>
+            <a:off x="5638384" y="1666823"/>
+            <a:ext cx="606028" cy="8406"/>
           </a:xfrm>
           <a:prstGeom prst="line">
             <a:avLst/>
@@ -6221,8 +6221,8 @@
         </p:nvCxnSpPr>
         <p:spPr>
           <a:xfrm>
-            <a:off x="5618991" y="2291471"/>
-            <a:ext cx="606028" cy="8407"/>
+            <a:off x="5618991" y="2111291"/>
+            <a:ext cx="606028" cy="8406"/>
           </a:xfrm>
           <a:prstGeom prst="line">
             <a:avLst/>
@@ -6260,8 +6260,8 @@
         </p:nvCxnSpPr>
         <p:spPr>
           <a:xfrm>
-            <a:off x="5626058" y="2839435"/>
-            <a:ext cx="606028" cy="8407"/>
+            <a:off x="5626058" y="2659255"/>
+            <a:ext cx="606028" cy="8406"/>
           </a:xfrm>
           <a:prstGeom prst="line">
             <a:avLst/>
@@ -6300,7 +6300,7 @@
         </p:nvCxnSpPr>
         <p:spPr>
           <a:xfrm>
-            <a:off x="5611010" y="1372347"/>
+            <a:off x="5611012" y="1192167"/>
             <a:ext cx="614013" cy="442744"/>
           </a:xfrm>
           <a:prstGeom prst="line">
@@ -6339,7 +6339,7 @@
         </p:nvCxnSpPr>
         <p:spPr>
           <a:xfrm>
-            <a:off x="5630428" y="1365718"/>
+            <a:off x="5630428" y="1185537"/>
             <a:ext cx="574172" cy="948306"/>
           </a:xfrm>
           <a:prstGeom prst="line">
@@ -6378,7 +6378,7 @@
         </p:nvCxnSpPr>
         <p:spPr>
           <a:xfrm>
-            <a:off x="5649850" y="1383746"/>
+            <a:off x="5649850" y="1203566"/>
             <a:ext cx="574172" cy="1487980"/>
           </a:xfrm>
           <a:prstGeom prst="line">
@@ -6418,7 +6418,7 @@
         </p:nvCxnSpPr>
         <p:spPr>
           <a:xfrm>
-            <a:off x="5618993" y="1806688"/>
+            <a:off x="5618995" y="1626509"/>
             <a:ext cx="599743" cy="466363"/>
           </a:xfrm>
           <a:prstGeom prst="line">
@@ -6458,7 +6458,7 @@
         </p:nvCxnSpPr>
         <p:spPr>
           <a:xfrm flipV="1">
-            <a:off x="5638359" y="1359591"/>
+            <a:off x="5638360" y="1179411"/>
             <a:ext cx="586660" cy="470712"/>
           </a:xfrm>
           <a:prstGeom prst="line">
@@ -6499,7 +6499,7 @@
         </p:nvCxnSpPr>
         <p:spPr>
           <a:xfrm>
-            <a:off x="5618991" y="1806685"/>
+            <a:off x="5618991" y="1626505"/>
             <a:ext cx="670792" cy="1145144"/>
           </a:xfrm>
           <a:prstGeom prst="line">
@@ -6538,7 +6538,7 @@
         </p:nvCxnSpPr>
         <p:spPr>
           <a:xfrm flipV="1">
-            <a:off x="5650576" y="1385714"/>
+            <a:off x="5650577" y="1205535"/>
             <a:ext cx="529181" cy="899177"/>
           </a:xfrm>
           <a:prstGeom prst="line">
@@ -6577,7 +6577,7 @@
         </p:nvCxnSpPr>
         <p:spPr>
           <a:xfrm flipV="1">
-            <a:off x="5631071" y="1818469"/>
+            <a:off x="5631071" y="1638290"/>
             <a:ext cx="570340" cy="1003207"/>
           </a:xfrm>
           <a:prstGeom prst="line">
@@ -6616,8 +6616,8 @@
         </p:nvCxnSpPr>
         <p:spPr>
           <a:xfrm flipV="1">
-            <a:off x="5636265" y="2311011"/>
-            <a:ext cx="557034" cy="492043"/>
+            <a:off x="5636265" y="2130832"/>
+            <a:ext cx="557034" cy="492042"/>
           </a:xfrm>
           <a:prstGeom prst="line">
             <a:avLst/>
@@ -6655,7 +6655,7 @@
         </p:nvCxnSpPr>
         <p:spPr>
           <a:xfrm flipV="1">
-            <a:off x="5655498" y="1382461"/>
+            <a:off x="5655500" y="1202282"/>
             <a:ext cx="553981" cy="1438755"/>
           </a:xfrm>
           <a:prstGeom prst="line">
@@ -6695,7 +6695,7 @@
         </p:nvCxnSpPr>
         <p:spPr>
           <a:xfrm>
-            <a:off x="5648856" y="2309433"/>
+            <a:off x="5648858" y="2129253"/>
             <a:ext cx="583233" cy="515366"/>
           </a:xfrm>
           <a:prstGeom prst="line">
@@ -6734,8 +6734,8 @@
         </p:nvCxnSpPr>
         <p:spPr>
           <a:xfrm flipV="1">
-            <a:off x="5628975" y="1861988"/>
-            <a:ext cx="580502" cy="440582"/>
+            <a:off x="5628977" y="1681807"/>
+            <a:ext cx="580501" cy="440582"/>
           </a:xfrm>
           <a:prstGeom prst="line">
             <a:avLst/>
@@ -6771,7 +6771,7 @@
         </p:nvSpPr>
         <p:spPr>
           <a:xfrm>
-            <a:off x="6948376" y="1291270"/>
+            <a:off x="6948377" y="1111090"/>
             <a:ext cx="342990" cy="302669"/>
           </a:xfrm>
           <a:prstGeom prst="ellipse">
@@ -6816,7 +6816,7 @@
         </p:nvSpPr>
         <p:spPr>
           <a:xfrm>
-            <a:off x="6955478" y="1735689"/>
+            <a:off x="6955479" y="1555510"/>
             <a:ext cx="342990" cy="302669"/>
           </a:xfrm>
           <a:prstGeom prst="ellipse">
@@ -6861,7 +6861,7 @@
         </p:nvSpPr>
         <p:spPr>
           <a:xfrm>
-            <a:off x="6968727" y="2628724"/>
+            <a:off x="6968728" y="2448544"/>
             <a:ext cx="342990" cy="302669"/>
           </a:xfrm>
           <a:prstGeom prst="ellipse">
@@ -6906,7 +6906,7 @@
         </p:nvSpPr>
         <p:spPr>
           <a:xfrm>
-            <a:off x="6982280" y="2185662"/>
+            <a:off x="6982281" y="2005482"/>
             <a:ext cx="281151" cy="394147"/>
           </a:xfrm>
           <a:prstGeom prst="rect">
@@ -6926,7 +6926,7 @@
               </a:lnSpc>
             </a:pPr>
             <a:r>
-              <a:rPr lang="en-US" altLang="zh-CN" b="1" dirty="0">
+              <a:rPr lang="en-US" altLang="zh-CN" sz="1799" b="1" dirty="0">
                 <a:solidFill>
                   <a:schemeClr val="bg1"/>
                 </a:solidFill>
@@ -6943,7 +6943,7 @@
               </a:lnSpc>
             </a:pPr>
             <a:r>
-              <a:rPr lang="en-US" altLang="zh-CN" b="1" dirty="0">
+              <a:rPr lang="en-US" altLang="zh-CN" sz="1799" b="1" dirty="0">
                 <a:solidFill>
                   <a:schemeClr val="bg1"/>
                 </a:solidFill>
@@ -6960,7 +6960,7 @@
               </a:lnSpc>
             </a:pPr>
             <a:r>
-              <a:rPr lang="en-US" altLang="zh-CN" b="1" dirty="0">
+              <a:rPr lang="en-US" altLang="zh-CN" sz="1799" b="1" dirty="0">
                 <a:solidFill>
                   <a:schemeClr val="bg1"/>
                 </a:solidFill>
@@ -6969,7 +6969,7 @@
               </a:rPr>
               <a:t>.</a:t>
             </a:r>
-            <a:endParaRPr lang="zh-CN" altLang="en-US" b="1" dirty="0">
+            <a:endParaRPr lang="zh-CN" altLang="en-US" sz="1799" b="1" dirty="0">
               <a:solidFill>
                 <a:schemeClr val="bg1"/>
               </a:solidFill>
@@ -6995,8 +6995,8 @@
         </p:nvCxnSpPr>
         <p:spPr>
           <a:xfrm>
-            <a:off x="6631937" y="1359095"/>
-            <a:ext cx="329362" cy="83010"/>
+            <a:off x="6631937" y="1178915"/>
+            <a:ext cx="329363" cy="83010"/>
           </a:xfrm>
           <a:prstGeom prst="line">
             <a:avLst/>
@@ -7035,7 +7035,7 @@
         </p:nvCxnSpPr>
         <p:spPr>
           <a:xfrm>
-            <a:off x="6619012" y="1359591"/>
+            <a:off x="6619012" y="1179410"/>
             <a:ext cx="318858" cy="527428"/>
           </a:xfrm>
           <a:prstGeom prst="line">
@@ -7075,7 +7075,7 @@
         </p:nvCxnSpPr>
         <p:spPr>
           <a:xfrm>
-            <a:off x="6638381" y="1365718"/>
+            <a:off x="6638381" y="1185537"/>
             <a:ext cx="330346" cy="1414336"/>
           </a:xfrm>
           <a:prstGeom prst="line">
@@ -7115,8 +7115,8 @@
         </p:nvCxnSpPr>
         <p:spPr>
           <a:xfrm>
-            <a:off x="6612036" y="1803276"/>
-            <a:ext cx="343442" cy="83747"/>
+            <a:off x="6612036" y="1623096"/>
+            <a:ext cx="343442" cy="83748"/>
           </a:xfrm>
           <a:prstGeom prst="line">
             <a:avLst/>
@@ -7155,7 +7155,7 @@
         </p:nvCxnSpPr>
         <p:spPr>
           <a:xfrm flipV="1">
-            <a:off x="6618492" y="1442601"/>
+            <a:off x="6618494" y="1262421"/>
             <a:ext cx="329887" cy="394140"/>
           </a:xfrm>
           <a:prstGeom prst="line">
@@ -7195,8 +7195,8 @@
         </p:nvCxnSpPr>
         <p:spPr>
           <a:xfrm>
-            <a:off x="6624949" y="1830305"/>
-            <a:ext cx="394008" cy="1056760"/>
+            <a:off x="6624949" y="1650125"/>
+            <a:ext cx="394008" cy="1056761"/>
           </a:xfrm>
           <a:prstGeom prst="line">
             <a:avLst/>
@@ -7236,7 +7236,7 @@
         </p:nvCxnSpPr>
         <p:spPr>
           <a:xfrm flipV="1">
-            <a:off x="6619013" y="1887020"/>
+            <a:off x="6619013" y="1706839"/>
             <a:ext cx="336466" cy="412856"/>
           </a:xfrm>
           <a:prstGeom prst="line">
@@ -7276,7 +7276,7 @@
         </p:nvCxnSpPr>
         <p:spPr>
           <a:xfrm flipV="1">
-            <a:off x="6647734" y="1442606"/>
+            <a:off x="6647736" y="1262427"/>
             <a:ext cx="300643" cy="840527"/>
           </a:xfrm>
           <a:prstGeom prst="line">
@@ -7316,7 +7316,7 @@
         </p:nvCxnSpPr>
         <p:spPr>
           <a:xfrm>
-            <a:off x="6647733" y="2303067"/>
+            <a:off x="6647734" y="2122888"/>
             <a:ext cx="371224" cy="584001"/>
           </a:xfrm>
           <a:prstGeom prst="line">
@@ -7356,7 +7356,7 @@
         </p:nvCxnSpPr>
         <p:spPr>
           <a:xfrm flipV="1">
-            <a:off x="6625527" y="1442602"/>
+            <a:off x="6625528" y="1262423"/>
             <a:ext cx="322848" cy="1354297"/>
           </a:xfrm>
           <a:prstGeom prst="line">
@@ -7396,8 +7396,8 @@
         </p:nvCxnSpPr>
         <p:spPr>
           <a:xfrm flipV="1">
-            <a:off x="6632050" y="1887019"/>
-            <a:ext cx="323428" cy="887786"/>
+            <a:off x="6632051" y="1706839"/>
+            <a:ext cx="323428" cy="887785"/>
           </a:xfrm>
           <a:prstGeom prst="line">
             <a:avLst/>
@@ -7436,7 +7436,7 @@
         </p:nvCxnSpPr>
         <p:spPr>
           <a:xfrm>
-            <a:off x="6652259" y="2768312"/>
+            <a:off x="6652260" y="2588131"/>
             <a:ext cx="366698" cy="118752"/>
           </a:xfrm>
           <a:prstGeom prst="line">
@@ -7473,7 +7473,7 @@
         </p:nvSpPr>
         <p:spPr>
           <a:xfrm>
-            <a:off x="7263880" y="1268048"/>
+            <a:off x="7263881" y="1087867"/>
             <a:ext cx="1742113" cy="261610"/>
           </a:xfrm>
           <a:prstGeom prst="rect">
@@ -7519,7 +7519,7 @@
         </p:nvSpPr>
         <p:spPr>
           <a:xfrm>
-            <a:off x="7258237" y="1740822"/>
+            <a:off x="7258239" y="1560641"/>
             <a:ext cx="1730101" cy="261610"/>
           </a:xfrm>
           <a:prstGeom prst="rect">
@@ -7565,7 +7565,7 @@
         </p:nvSpPr>
         <p:spPr>
           <a:xfrm>
-            <a:off x="7293774" y="2635589"/>
+            <a:off x="7293776" y="2455408"/>
             <a:ext cx="1694565" cy="261610"/>
           </a:xfrm>
           <a:prstGeom prst="rect">
@@ -7597,8 +7597,8 @@
           </a:p>
         </p:txBody>
       </p:sp>
-      <mc:AlternateContent xmlns:mc="http://schemas.openxmlformats.org/markup-compatibility/2006" xmlns:a14="http://schemas.microsoft.com/office/drawing/2010/main">
-        <mc:Choice Requires="a14">
+      <mc:AlternateContent xmlns:mc="http://schemas.openxmlformats.org/markup-compatibility/2006">
+        <mc:Choice xmlns:a14="http://schemas.microsoft.com/office/drawing/2010/main" Requires="a14">
           <p:sp>
             <p:nvSpPr>
               <p:cNvPr id="185" name="文本框 184">
@@ -7613,7 +7613,7 @@
             </p:nvSpPr>
             <p:spPr>
               <a:xfrm rot="10800000">
-                <a:off x="8285145" y="1442128"/>
+                <a:off x="8285147" y="1168059"/>
                 <a:ext cx="805617" cy="1366528"/>
               </a:xfrm>
               <a:prstGeom prst="rect">
@@ -7680,7 +7680,7 @@
             </p:txBody>
           </p:sp>
         </mc:Choice>
-        <mc:Fallback xmlns="">
+        <mc:Fallback>
           <p:sp>
             <p:nvSpPr>
               <p:cNvPr id="185" name="文本框 184">
@@ -7697,7 +7697,7 @@
             </p:nvSpPr>
             <p:spPr>
               <a:xfrm rot="10800000">
-                <a:off x="8285145" y="1442128"/>
+                <a:off x="8285147" y="1168059"/>
                 <a:ext cx="805617" cy="1366528"/>
               </a:xfrm>
               <a:prstGeom prst="rect">
@@ -7743,8 +7743,8 @@
         </p:nvCxnSpPr>
         <p:spPr>
           <a:xfrm rot="16200000" flipV="1">
-            <a:off x="8230139" y="-835422"/>
-            <a:ext cx="870589" cy="3988925"/>
+            <a:off x="8246816" y="-998921"/>
+            <a:ext cx="870590" cy="3955566"/>
           </a:xfrm>
           <a:prstGeom prst="bentConnector3">
             <a:avLst>
@@ -7784,8 +7784,8 @@
         </p:nvSpPr>
         <p:spPr>
           <a:xfrm>
-            <a:off x="10017718" y="1911811"/>
-            <a:ext cx="1445746" cy="351956"/>
+            <a:off x="10017718" y="1731630"/>
+            <a:ext cx="1445746" cy="369204"/>
           </a:xfrm>
           <a:prstGeom prst="rect">
             <a:avLst/>
@@ -7799,7 +7799,7 @@
           <a:lstStyle/>
           <a:p>
             <a:r>
-              <a:rPr lang="en-US" altLang="zh-CN" b="1" dirty="0">
+              <a:rPr lang="en-US" altLang="zh-CN" sz="1799" b="1" dirty="0">
                 <a:solidFill>
                   <a:schemeClr val="bg1"/>
                 </a:solidFill>
@@ -7807,7 +7807,7 @@
               </a:rPr>
               <a:t>Inference</a:t>
             </a:r>
-            <a:endParaRPr lang="zh-CN" altLang="en-US" b="1" dirty="0">
+            <a:endParaRPr lang="zh-CN" altLang="en-US" sz="1799" b="1" dirty="0">
               <a:solidFill>
                 <a:schemeClr val="bg1"/>
               </a:solidFill>
@@ -7829,7 +7829,7 @@
         </p:nvSpPr>
         <p:spPr>
           <a:xfrm>
-            <a:off x="5874059" y="2936893"/>
+            <a:off x="5874061" y="2756714"/>
             <a:ext cx="1838383" cy="277127"/>
           </a:xfrm>
           <a:prstGeom prst="rect">
@@ -7873,7 +7873,7 @@
         </p:nvSpPr>
         <p:spPr>
           <a:xfrm>
-            <a:off x="2044403" y="3204652"/>
+            <a:off x="2044403" y="3024472"/>
             <a:ext cx="342882" cy="523541"/>
           </a:xfrm>
           <a:prstGeom prst="rect">
@@ -7909,7 +7909,7 @@
         </p:nvSpPr>
         <p:spPr>
           <a:xfrm>
-            <a:off x="1640667" y="2282578"/>
+            <a:off x="1640668" y="2102398"/>
             <a:ext cx="342882" cy="523541"/>
           </a:xfrm>
           <a:prstGeom prst="rect">
@@ -7945,7 +7945,7 @@
         </p:nvSpPr>
         <p:spPr>
           <a:xfrm>
-            <a:off x="2102009" y="1317571"/>
+            <a:off x="2102009" y="1137391"/>
             <a:ext cx="342882" cy="523541"/>
           </a:xfrm>
           <a:prstGeom prst="rect">
@@ -7983,8 +7983,8 @@
             </p:nvSpPr>
             <p:spPr>
               <a:xfrm>
-                <a:off x="634466" y="664105"/>
-                <a:ext cx="1838383" cy="615553"/>
+                <a:off x="435069" y="515492"/>
+                <a:ext cx="1838383" cy="615425"/>
               </a:xfrm>
               <a:prstGeom prst="rect">
                 <a:avLst/>
@@ -7998,7 +7998,7 @@
               <a:lstStyle/>
               <a:p>
                 <a:r>
-                  <a:rPr lang="en-US" altLang="zh-CN" b="1" dirty="0">
+                  <a:rPr lang="en-US" altLang="zh-CN" sz="1799" b="1" dirty="0">
                     <a:solidFill>
                       <a:schemeClr val="bg1"/>
                     </a:solidFill>
@@ -8010,7 +8010,7 @@
                     <m:sSub>
                       <m:sSubPr>
                         <m:ctrlPr>
-                          <a:rPr lang="en-US" altLang="zh-CN" b="1" i="1">
+                          <a:rPr lang="en-US" altLang="zh-CN" sz="1799" b="1" i="1">
                             <a:solidFill>
                               <a:schemeClr val="bg1"/>
                             </a:solidFill>
@@ -8020,7 +8020,7 @@
                       </m:sSubPr>
                       <m:e>
                         <m:r>
-                          <a:rPr lang="en-US" altLang="zh-CN" b="1" i="1">
+                          <a:rPr lang="en-US" altLang="zh-CN" sz="1799" b="1" i="1">
                             <a:solidFill>
                               <a:schemeClr val="bg1"/>
                             </a:solidFill>
@@ -8031,7 +8031,7 @@
                       </m:e>
                       <m:sub>
                         <m:r>
-                          <a:rPr lang="en-US" altLang="zh-CN" b="1" i="1">
+                          <a:rPr lang="en-US" altLang="zh-CN" sz="1799" b="1" i="1">
                             <a:solidFill>
                               <a:schemeClr val="bg1"/>
                             </a:solidFill>
@@ -8043,7 +8043,7 @@
                     </m:sSub>
                   </m:oMath>
                 </a14:m>
-                <a:endParaRPr lang="en-US" altLang="zh-CN" b="1" dirty="0">
+                <a:endParaRPr lang="en-US" altLang="zh-CN" sz="1799" b="1" dirty="0">
                   <a:solidFill>
                     <a:schemeClr val="bg1"/>
                   </a:solidFill>
@@ -8076,8 +8076,8 @@
             </p:nvSpPr>
             <p:spPr>
               <a:xfrm>
-                <a:off x="634466" y="664105"/>
-                <a:ext cx="1838383" cy="615553"/>
+                <a:off x="435069" y="515492"/>
+                <a:ext cx="1838383" cy="615425"/>
               </a:xfrm>
               <a:prstGeom prst="rect">
                 <a:avLst/>
@@ -8085,7 +8085,7 @@
               <a:blipFill>
                 <a:blip r:embed="rId14"/>
                 <a:stretch>
-                  <a:fillRect l="-2649" t="-5941"/>
+                  <a:fillRect l="-2318" t="-2970"/>
                 </a:stretch>
               </a:blipFill>
             </p:spPr>
@@ -8104,8 +8104,8 @@
           </p:sp>
         </mc:Fallback>
       </mc:AlternateContent>
-      <mc:AlternateContent xmlns:mc="http://schemas.openxmlformats.org/markup-compatibility/2006" xmlns:a14="http://schemas.microsoft.com/office/drawing/2010/main">
-        <mc:Choice Requires="a14">
+      <mc:AlternateContent xmlns:mc="http://schemas.openxmlformats.org/markup-compatibility/2006">
+        <mc:Choice xmlns:a14="http://schemas.microsoft.com/office/drawing/2010/main" Requires="a14">
           <p:sp>
             <p:nvSpPr>
               <p:cNvPr id="124" name="文本框 9">
@@ -8119,9 +8119,9 @@
               <p:nvPr/>
             </p:nvSpPr>
             <p:spPr>
-              <a:xfrm>
-                <a:off x="6757247" y="58928"/>
-                <a:ext cx="6667500" cy="400238"/>
+              <a:xfrm rot="10800000" flipV="1">
+                <a:off x="7038819" y="-7913"/>
+                <a:ext cx="3934337" cy="338554"/>
               </a:xfrm>
               <a:prstGeom prst="rect">
                 <a:avLst/>
@@ -8231,13 +8231,13 @@
                 <a14:m>
                   <m:oMath xmlns:m="http://schemas.openxmlformats.org/officeDocument/2006/math">
                     <m:r>
-                      <a:rPr lang="en-US" altLang="zh-CN" sz="2001" i="1">
+                      <a:rPr lang="en-US" altLang="zh-CN" sz="1600" i="1">
                         <a:latin typeface="Cambria Math" panose="02040503050406030204" pitchFamily="18" charset="0"/>
                       </a:rPr>
                       <m:t>𝑅𝑒𝑤𝑎𝑟𝑑</m:t>
                     </m:r>
                     <m:r>
-                      <a:rPr lang="en-US" altLang="zh-CN" sz="2001" i="1">
+                      <a:rPr lang="en-US" altLang="zh-CN" sz="1600" i="1">
                         <a:latin typeface="Cambria Math" panose="02040503050406030204" pitchFamily="18" charset="0"/>
                       </a:rPr>
                       <m:t>=</m:t>
@@ -8245,7 +8245,7 @@
                   </m:oMath>
                 </a14:m>
                 <a:r>
-                  <a:rPr lang="en-US" altLang="zh-CN" sz="2001" dirty="0"/>
+                  <a:rPr lang="en-US" altLang="zh-CN" sz="1600" dirty="0"/>
                   <a:t> </a:t>
                 </a:r>
                 <a14:m>
@@ -8254,13 +8254,13 @@
                       <m:rPr>
                         <m:sty m:val="p"/>
                       </m:rPr>
-                      <a:rPr lang="en-US" altLang="zh-CN" sz="2001" i="1">
+                      <a:rPr lang="en-US" altLang="zh-CN" sz="1600" i="1">
                         <a:latin typeface="Cambria Math" panose="02040503050406030204" pitchFamily="18" charset="0"/>
                       </a:rPr>
                       <m:t>β</m:t>
                     </m:r>
                     <m:r>
-                      <a:rPr lang="en-US" altLang="zh-CN" sz="2001">
+                      <a:rPr lang="en-US" altLang="zh-CN" sz="1600">
                         <a:latin typeface="Cambria Math" panose="02040503050406030204" pitchFamily="18" charset="0"/>
                         <a:ea typeface="Cambria Math" panose="02040503050406030204" pitchFamily="18" charset="0"/>
                       </a:rPr>
@@ -8270,7 +8270,7 @@
                       <m:rPr>
                         <m:sty m:val="p"/>
                       </m:rPr>
-                      <a:rPr lang="en-US" altLang="zh-CN" sz="2001">
+                      <a:rPr lang="en-US" altLang="zh-CN" sz="1600">
                         <a:latin typeface="Cambria Math" panose="02040503050406030204" pitchFamily="18" charset="0"/>
                         <a:ea typeface="Cambria Math" panose="02040503050406030204" pitchFamily="18" charset="0"/>
                       </a:rPr>
@@ -8279,13 +8279,13 @@
                   </m:oMath>
                 </a14:m>
                 <a:r>
-                  <a:rPr lang="en-US" altLang="zh-CN" sz="2001" dirty="0"/>
+                  <a:rPr lang="en-US" altLang="zh-CN" sz="1600" dirty="0"/>
                   <a:t> </a:t>
                 </a:r>
                 <a14:m>
                   <m:oMath xmlns:m="http://schemas.openxmlformats.org/officeDocument/2006/math">
                     <m:r>
-                      <a:rPr lang="en-US" altLang="zh-CN" sz="2001" i="1" dirty="0">
+                      <a:rPr lang="en-US" altLang="zh-CN" sz="1600" i="1" dirty="0">
                         <a:latin typeface="Cambria Math" panose="02040503050406030204" pitchFamily="18" charset="0"/>
                       </a:rPr>
                       <m:t>−(1−</m:t>
@@ -8294,13 +8294,13 @@
                       <m:rPr>
                         <m:sty m:val="p"/>
                       </m:rPr>
-                      <a:rPr lang="en-US" altLang="zh-CN" sz="2001" i="1" dirty="0">
+                      <a:rPr lang="en-US" altLang="zh-CN" sz="1600" i="1" dirty="0">
                         <a:latin typeface="Cambria Math" panose="02040503050406030204" pitchFamily="18" charset="0"/>
                       </a:rPr>
                       <m:t>β</m:t>
                     </m:r>
                     <m:r>
-                      <a:rPr lang="en-US" altLang="zh-CN" sz="2001" i="1" dirty="0">
+                      <a:rPr lang="en-US" altLang="zh-CN" sz="1600" i="1" dirty="0">
                         <a:latin typeface="Cambria Math" panose="02040503050406030204" pitchFamily="18" charset="0"/>
                       </a:rPr>
                       <m:t>)×</m:t>
@@ -8308,7 +8308,7 @@
                   </m:oMath>
                 </a14:m>
                 <a:r>
-                  <a:rPr lang="en-US" altLang="zh-CN" sz="2001" dirty="0"/>
+                  <a:rPr lang="en-US" altLang="zh-CN" sz="1600" dirty="0"/>
                   <a:t> </a:t>
                 </a:r>
                 <a14:m>
@@ -8317,7 +8317,7 @@
                       <m:rPr>
                         <m:lit/>
                       </m:rPr>
-                      <a:rPr lang="en-US" altLang="zh-CN" sz="2001">
+                      <a:rPr lang="en-US" altLang="zh-CN" sz="1600">
                         <a:latin typeface="Cambria Math" panose="02040503050406030204" pitchFamily="18" charset="0"/>
                       </a:rPr>
                       <m:t> </m:t>
@@ -8326,7 +8326,7 @@
                       <m:rPr>
                         <m:sty m:val="p"/>
                       </m:rPr>
-                      <a:rPr lang="en-US" altLang="zh-CN" sz="2001" i="1">
+                      <a:rPr lang="en-US" altLang="zh-CN" sz="1600" i="1">
                         <a:latin typeface="Cambria Math" panose="02040503050406030204" pitchFamily="18" charset="0"/>
                       </a:rPr>
                       <m:t>Δ</m:t>
@@ -8334,7 +8334,7 @@
                   </m:oMath>
                 </a14:m>
                 <a:r>
-                  <a:rPr lang="en-US" altLang="zh-CN" sz="2001" i="1" dirty="0">
+                  <a:rPr lang="en-US" altLang="zh-CN" sz="1600" i="1" dirty="0">
                     <a:latin typeface="Cambria Math" panose="02040503050406030204" pitchFamily="18" charset="0"/>
                   </a:rPr>
                   <a:t>s</a:t>
@@ -8343,7 +8343,7 @@
             </p:txBody>
           </p:sp>
         </mc:Choice>
-        <mc:Fallback xmlns="">
+        <mc:Fallback>
           <p:sp>
             <p:nvSpPr>
               <p:cNvPr id="124" name="文本框 9">
@@ -8359,9 +8359,9 @@
               <p:nvPr/>
             </p:nvSpPr>
             <p:spPr>
-              <a:xfrm>
-                <a:off x="6757247" y="58928"/>
-                <a:ext cx="6667500" cy="400238"/>
+              <a:xfrm rot="10800000" flipV="1">
+                <a:off x="7038819" y="-7913"/>
+                <a:ext cx="3934337" cy="338554"/>
               </a:xfrm>
               <a:prstGeom prst="rect">
                 <a:avLst/>
@@ -8369,7 +8369,7 @@
               <a:blipFill>
                 <a:blip r:embed="rId15"/>
                 <a:stretch>
-                  <a:fillRect t="-12308" b="-24615"/>
+                  <a:fillRect t="-9091" b="-20000"/>
                 </a:stretch>
               </a:blipFill>
             </p:spPr>
@@ -8402,7 +8402,7 @@
         </p:nvSpPr>
         <p:spPr>
           <a:xfrm>
-            <a:off x="3558262" y="2023058"/>
+            <a:off x="3558262" y="1842878"/>
             <a:ext cx="986940" cy="549342"/>
           </a:xfrm>
           <a:prstGeom prst="rightArrow">
@@ -8440,7 +8440,7 @@
           <a:lstStyle/>
           <a:p>
             <a:pPr algn="ctr"/>
-            <a:endParaRPr lang="zh-CN" altLang="en-US">
+            <a:endParaRPr lang="zh-CN" altLang="en-US" sz="1799">
               <a:ln>
                 <a:solidFill>
                   <a:schemeClr val="bg1"/>
@@ -8466,7 +8466,7 @@
         </p:nvCxnSpPr>
         <p:spPr>
           <a:xfrm flipV="1">
-            <a:off x="9154389" y="2096478"/>
+            <a:off x="9154391" y="1916297"/>
             <a:ext cx="597735" cy="5356"/>
           </a:xfrm>
           <a:prstGeom prst="straightConnector1">

</xml_diff>